<commit_message>
updated load_data.py and related docs
</commit_message>
<xml_diff>
--- a/docs/system_architecture.pptx
+++ b/docs/system_architecture.pptx
@@ -2373,14 +2373,14 @@
       </dgm:t>
     </dgm:pt>
     <dgm:pt modelId="{6F5E7D44-1557-4D24-B418-71C970AD6BEF}">
-      <dgm:prSet/>
+      <dgm:prSet custT="1"/>
       <dgm:spPr/>
       <dgm:t>
         <a:bodyPr/>
         <a:lstStyle/>
         <a:p>
           <a:r>
-            <a:rPr lang="en-SG" dirty="0"/>
+            <a:rPr lang="en-SG" sz="1600" dirty="0"/>
             <a:t>Data Sources (Unstructured — Singapore Budgets)</a:t>
           </a:r>
         </a:p>
@@ -2409,14 +2409,14 @@
       </dgm:t>
     </dgm:pt>
     <dgm:pt modelId="{079FAE3C-BF08-425F-BECA-798B744C0D11}">
-      <dgm:prSet/>
+      <dgm:prSet custT="1"/>
       <dgm:spPr/>
       <dgm:t>
         <a:bodyPr/>
         <a:lstStyle/>
         <a:p>
           <a:r>
-            <a:rPr lang="en-SG" dirty="0"/>
+            <a:rPr lang="en-SG" sz="1600" dirty="0"/>
             <a:t>Ingestion &amp; Preprocessing</a:t>
           </a:r>
         </a:p>
@@ -2445,7 +2445,7 @@
       </dgm:t>
     </dgm:pt>
     <dgm:pt modelId="{27C25BF8-704C-4EDD-AD83-35C8EFC3F1E2}">
-      <dgm:prSet/>
+      <dgm:prSet custT="1"/>
       <dgm:spPr/>
       <dgm:t>
         <a:bodyPr/>
@@ -2455,7 +2455,7 @@
             <a:buNone/>
           </a:pPr>
           <a:r>
-            <a:rPr lang="en-SG" dirty="0"/>
+            <a:rPr lang="en-SG" sz="1600" dirty="0"/>
             <a:t>Knowledge Stores</a:t>
           </a:r>
         </a:p>
@@ -2494,8 +2494,8 @@
             <a:buNone/>
           </a:pPr>
           <a:r>
-            <a:rPr lang="en-SG" sz="1700" dirty="0"/>
-            <a:t>RAG &amp; Agentic AI</a:t>
+            <a:rPr lang="en-SG" sz="1600" dirty="0"/>
+            <a:t>RAG &amp; Agentic AI Orchestration</a:t>
           </a:r>
         </a:p>
       </dgm:t>
@@ -2523,14 +2523,14 @@
       </dgm:t>
     </dgm:pt>
     <dgm:pt modelId="{CA85AEC3-64F6-4ABB-BAE0-5B3CFE072DA2}">
-      <dgm:prSet/>
+      <dgm:prSet custT="1"/>
       <dgm:spPr/>
       <dgm:t>
         <a:bodyPr/>
         <a:lstStyle/>
         <a:p>
           <a:r>
-            <a:rPr lang="en-SG" dirty="0"/>
+            <a:rPr lang="en-SG" sz="1600" dirty="0"/>
             <a:t>Response</a:t>
           </a:r>
         </a:p>
@@ -2559,7 +2559,7 @@
       </dgm:t>
     </dgm:pt>
     <dgm:pt modelId="{FC0F9AFE-2DC1-4CC8-B649-12982D951021}">
-      <dgm:prSet/>
+      <dgm:prSet custT="1"/>
       <dgm:spPr/>
       <dgm:t>
         <a:bodyPr/>
@@ -2570,7 +2570,7 @@
             <a:buChar char="•"/>
           </a:pPr>
           <a:r>
-            <a:rPr lang="en-SG" dirty="0"/>
+            <a:rPr lang="en-SG" sz="1200" dirty="0"/>
             <a:t>Vector DB</a:t>
           </a:r>
         </a:p>
@@ -2599,15 +2599,15 @@
       </dgm:t>
     </dgm:pt>
     <dgm:pt modelId="{160C48D4-816C-4610-8145-C4A8BA1165ED}">
-      <dgm:prSet/>
+      <dgm:prSet custT="1"/>
       <dgm:spPr/>
       <dgm:t>
         <a:bodyPr/>
         <a:lstStyle/>
         <a:p>
           <a:r>
-            <a:rPr lang="en-SG" dirty="0"/>
-            <a:t>Selected multi-modal sources normalized to text </a:t>
+            <a:rPr lang="en-SG" sz="1200" dirty="0"/>
+            <a:t>Tag sources by Financial Year,  Type (Budget Statement / Round-Up Speech)</a:t>
           </a:r>
         </a:p>
       </dgm:t>
@@ -2635,15 +2635,15 @@
       </dgm:t>
     </dgm:pt>
     <dgm:pt modelId="{CF4E7E4F-DF45-4333-BC11-CA48C662E33A}">
-      <dgm:prSet/>
+      <dgm:prSet custT="1"/>
       <dgm:spPr/>
       <dgm:t>
         <a:bodyPr/>
         <a:lstStyle/>
         <a:p>
           <a:r>
-            <a:rPr lang="en-SG" dirty="0"/>
-            <a:t>Budget – 2025 (multi-modal sources; e.g. pdf/html, video-to-transcript)</a:t>
+            <a:rPr lang="en-SG" sz="1200" dirty="0"/>
+            <a:t>10 years Budget Statements, Round-Up Speeches – FY2016 - FY2025</a:t>
           </a:r>
         </a:p>
       </dgm:t>
@@ -2671,14 +2671,14 @@
       </dgm:t>
     </dgm:pt>
     <dgm:pt modelId="{4F971BCF-6BF9-4240-BD4F-DF7FC6ED3A3C}">
-      <dgm:prSet/>
+      <dgm:prSet custT="1"/>
       <dgm:spPr/>
       <dgm:t>
         <a:bodyPr/>
         <a:lstStyle/>
         <a:p>
           <a:r>
-            <a:rPr lang="en-SG" dirty="0"/>
+            <a:rPr lang="en-SG" sz="1200" dirty="0"/>
             <a:t>Dense semantic embedding + Sparse lexical retrieval (BM25)</a:t>
           </a:r>
         </a:p>
@@ -2707,14 +2707,14 @@
       </dgm:t>
     </dgm:pt>
     <dgm:pt modelId="{AD318CD4-0D24-4292-960A-331D4871A296}">
-      <dgm:prSet/>
+      <dgm:prSet custT="1"/>
       <dgm:spPr/>
       <dgm:t>
         <a:bodyPr/>
         <a:lstStyle/>
         <a:p>
           <a:r>
-            <a:rPr lang="en-SG" dirty="0"/>
+            <a:rPr lang="en-SG" sz="1200" dirty="0"/>
             <a:t>Overlapping chunking</a:t>
           </a:r>
         </a:p>
@@ -2742,42 +2742,6 @@
         </a:p>
       </dgm:t>
     </dgm:pt>
-    <dgm:pt modelId="{51F321CE-A9D2-43B2-BBC6-5D911A2C430D}">
-      <dgm:prSet custT="1"/>
-      <dgm:spPr/>
-      <dgm:t>
-        <a:bodyPr/>
-        <a:lstStyle/>
-        <a:p>
-          <a:r>
-            <a:rPr lang="en-SG" sz="1300" b="1" dirty="0"/>
-            <a:t>RAG &amp; Agentic AI Orchestration</a:t>
-          </a:r>
-        </a:p>
-      </dgm:t>
-    </dgm:pt>
-    <dgm:pt modelId="{F3C3F2C6-2B33-41DE-A224-5AB97F56CE35}" type="parTrans" cxnId="{4A1E04E2-21F6-4A6E-A12E-2F8C235FECA6}">
-      <dgm:prSet/>
-      <dgm:spPr/>
-      <dgm:t>
-        <a:bodyPr/>
-        <a:lstStyle/>
-        <a:p>
-          <a:endParaRPr lang="en-SG"/>
-        </a:p>
-      </dgm:t>
-    </dgm:pt>
-    <dgm:pt modelId="{B9B6FE16-BED0-4D31-81DE-5CC4ADD13DA7}" type="sibTrans" cxnId="{4A1E04E2-21F6-4A6E-A12E-2F8C235FECA6}">
-      <dgm:prSet/>
-      <dgm:spPr/>
-      <dgm:t>
-        <a:bodyPr/>
-        <a:lstStyle/>
-        <a:p>
-          <a:endParaRPr lang="en-SG"/>
-        </a:p>
-      </dgm:t>
-    </dgm:pt>
     <dgm:pt modelId="{3BD596F6-11EB-48AD-9E08-8787E5F683F7}">
       <dgm:prSet custT="1"/>
       <dgm:spPr/>
@@ -2790,10 +2754,10 @@
             <a:buChar char="•"/>
           </a:pPr>
           <a:r>
-            <a:rPr lang="en-SG" sz="1300" dirty="0"/>
+            <a:rPr lang="en-SG" sz="1200" dirty="0"/>
             <a:t>With re-ranking retrieval (cross-encoder transformers, non-LLM)</a:t>
           </a:r>
-          <a:endParaRPr lang="en-SG" sz="1300" b="1" dirty="0"/>
+          <a:endParaRPr lang="en-SG" sz="1200" b="1" dirty="0"/>
         </a:p>
       </dgm:t>
     </dgm:pt>
@@ -2877,7 +2841,7 @@
       <dgm:spPr/>
     </dgm:pt>
     <dgm:pt modelId="{35C9A030-F680-4047-A5AD-E01589EA65AB}" type="pres">
-      <dgm:prSet presAssocID="{8D939E49-1DCF-4EA5-8FAD-4C10D1706BBA}" presName="node" presStyleLbl="node1" presStyleIdx="3" presStyleCnt="5" custScaleY="99988" custLinFactNeighborX="5231" custLinFactNeighborY="-226">
+      <dgm:prSet presAssocID="{8D939E49-1DCF-4EA5-8FAD-4C10D1706BBA}" presName="node" presStyleLbl="node1" presStyleIdx="3" presStyleCnt="5" custScaleX="104663" custScaleY="99988" custLinFactNeighborX="5231" custLinFactNeighborY="-226">
         <dgm:presLayoutVars>
           <dgm:bulletEnabled val="1"/>
         </dgm:presLayoutVars>
@@ -2905,7 +2869,6 @@
     <dgm:cxn modelId="{48F04302-DD6A-484E-AFCD-D92C8A99D2A8}" type="presOf" srcId="{4E8D1881-922E-437F-B010-AA1E6A222DFE}" destId="{5ACAF45A-2293-4DEB-A521-8230FD18B43C}" srcOrd="0" destOrd="0" presId="urn:microsoft.com/office/officeart/2005/8/layout/process1"/>
     <dgm:cxn modelId="{5CC78B03-FFE8-4425-B89B-296BEC8F4D01}" srcId="{079FAE3C-BF08-425F-BECA-798B744C0D11}" destId="{4F971BCF-6BF9-4240-BD4F-DF7FC6ED3A3C}" srcOrd="2" destOrd="0" parTransId="{7FD38D87-98A3-4038-AAB3-ED60042E90AB}" sibTransId="{EAEAFAAC-29C2-4173-BB09-A9ACE02CAA4A}"/>
     <dgm:cxn modelId="{09675112-9356-460B-804C-288F82767D17}" type="presOf" srcId="{AD318CD4-0D24-4292-960A-331D4871A296}" destId="{92C6CB1E-8AB8-417B-99FC-BDB0633FF67D}" srcOrd="0" destOrd="2" presId="urn:microsoft.com/office/officeart/2005/8/layout/process1"/>
-    <dgm:cxn modelId="{B5E88F15-8D48-4F69-AFCD-BB90541646B4}" type="presOf" srcId="{51F321CE-A9D2-43B2-BBC6-5D911A2C430D}" destId="{35C9A030-F680-4047-A5AD-E01589EA65AB}" srcOrd="0" destOrd="1" presId="urn:microsoft.com/office/officeart/2005/8/layout/process1"/>
     <dgm:cxn modelId="{D59C6718-48B0-41EE-9EFB-8567CAE979BE}" srcId="{6F5E7D44-1557-4D24-B418-71C970AD6BEF}" destId="{CF4E7E4F-DF45-4333-BC11-CA48C662E33A}" srcOrd="0" destOrd="0" parTransId="{97FD80C0-EE24-4989-AC3B-3D2B9D1C6DD7}" sibTransId="{71FD74C0-1BD3-4910-A6E2-97861893B144}"/>
     <dgm:cxn modelId="{B41D552A-A7CD-48A2-B689-A82BDFD5B0FF}" srcId="{27C25BF8-704C-4EDD-AD83-35C8EFC3F1E2}" destId="{FC0F9AFE-2DC1-4CC8-B649-12982D951021}" srcOrd="0" destOrd="0" parTransId="{2FAC6633-295A-4515-96D7-FE1B808C1B63}" sibTransId="{9EDD29D1-B9DF-44B0-8902-9E49AD4AC93B}"/>
     <dgm:cxn modelId="{A558902C-FACF-49D9-9753-2D0A7C7E17C0}" type="presOf" srcId="{27C25BF8-704C-4EDD-AD83-35C8EFC3F1E2}" destId="{35E22166-92D8-4563-AFE1-94814331420D}" srcOrd="0" destOrd="0" presId="urn:microsoft.com/office/officeart/2005/8/layout/process1"/>
@@ -2920,21 +2883,20 @@
     <dgm:cxn modelId="{01EF8482-E188-4101-9624-DEB60ECB022A}" type="presOf" srcId="{079FAE3C-BF08-425F-BECA-798B744C0D11}" destId="{92C6CB1E-8AB8-417B-99FC-BDB0633FF67D}" srcOrd="0" destOrd="0" presId="urn:microsoft.com/office/officeart/2005/8/layout/process1"/>
     <dgm:cxn modelId="{B951F189-DCBE-4370-91A7-4D2985A5388C}" type="presOf" srcId="{8D939E49-1DCF-4EA5-8FAD-4C10D1706BBA}" destId="{35C9A030-F680-4047-A5AD-E01589EA65AB}" srcOrd="0" destOrd="0" presId="urn:microsoft.com/office/officeart/2005/8/layout/process1"/>
     <dgm:cxn modelId="{FF98CE97-4217-4FC3-9B86-5BBDA540C0A6}" type="presOf" srcId="{8B4A4F78-DE25-471A-8C80-F5931F735A9D}" destId="{7894FAD1-982C-4135-BFAC-AAC3B729DCE7}" srcOrd="0" destOrd="0" presId="urn:microsoft.com/office/officeart/2005/8/layout/process1"/>
-    <dgm:cxn modelId="{6E8C0B99-21F6-469C-A307-83DD79A42450}" type="presOf" srcId="{3BD596F6-11EB-48AD-9E08-8787E5F683F7}" destId="{35C9A030-F680-4047-A5AD-E01589EA65AB}" srcOrd="0" destOrd="2" presId="urn:microsoft.com/office/officeart/2005/8/layout/process1"/>
+    <dgm:cxn modelId="{6E8C0B99-21F6-469C-A307-83DD79A42450}" type="presOf" srcId="{3BD596F6-11EB-48AD-9E08-8787E5F683F7}" destId="{35C9A030-F680-4047-A5AD-E01589EA65AB}" srcOrd="0" destOrd="1" presId="urn:microsoft.com/office/officeart/2005/8/layout/process1"/>
     <dgm:cxn modelId="{B6895D99-57E2-4E90-96D1-6D8068EF1F00}" srcId="{33C774CC-5ABC-4DBC-AA95-95A8E9530D0F}" destId="{27C25BF8-704C-4EDD-AD83-35C8EFC3F1E2}" srcOrd="2" destOrd="0" parTransId="{B1030CD2-66E4-4418-B5D8-421063A87A63}" sibTransId="{24A5978D-6909-40FE-907E-7396AD1AE1D2}"/>
     <dgm:cxn modelId="{BF37E6A6-BF8A-4A85-8947-CA083D59FDA9}" srcId="{33C774CC-5ABC-4DBC-AA95-95A8E9530D0F}" destId="{8D939E49-1DCF-4EA5-8FAD-4C10D1706BBA}" srcOrd="3" destOrd="0" parTransId="{FBE8369D-0324-41FE-B007-2B20E3C80C06}" sibTransId="{8B4A4F78-DE25-471A-8C80-F5931F735A9D}"/>
     <dgm:cxn modelId="{C269F3A7-87C3-4D9A-876B-A752FFEC4C5E}" type="presOf" srcId="{E0E4E17F-FE6C-4091-ACB5-7F2D6C4BE1D7}" destId="{C8C2DF9B-2592-4876-8559-E8894F0B09C5}" srcOrd="0" destOrd="0" presId="urn:microsoft.com/office/officeart/2005/8/layout/process1"/>
     <dgm:cxn modelId="{CFE1F6AD-C461-422A-BF11-02DF52A75FFE}" type="presOf" srcId="{CA85AEC3-64F6-4ABB-BAE0-5B3CFE072DA2}" destId="{C16203E6-504B-4580-8F87-8CBB85053497}" srcOrd="0" destOrd="0" presId="urn:microsoft.com/office/officeart/2005/8/layout/process1"/>
     <dgm:cxn modelId="{4A5825BA-5664-4E5A-8EB9-F6C7A6474C13}" srcId="{079FAE3C-BF08-425F-BECA-798B744C0D11}" destId="{AD318CD4-0D24-4292-960A-331D4871A296}" srcOrd="1" destOrd="0" parTransId="{5DD6E0D8-1627-48EF-946B-F1C280CE00B7}" sibTransId="{DC3EF715-4F6E-4BEB-9B25-6555509B9B9C}"/>
     <dgm:cxn modelId="{D50FCABB-2625-4041-9D9B-C96FCFBFBACF}" type="presOf" srcId="{CF4E7E4F-DF45-4333-BC11-CA48C662E33A}" destId="{8B60FB5F-05B2-459A-9300-9D95BF839B98}" srcOrd="0" destOrd="1" presId="urn:microsoft.com/office/officeart/2005/8/layout/process1"/>
-    <dgm:cxn modelId="{DA735BC0-76E0-474D-853A-9CAFEAD6275A}" srcId="{8D939E49-1DCF-4EA5-8FAD-4C10D1706BBA}" destId="{3BD596F6-11EB-48AD-9E08-8787E5F683F7}" srcOrd="1" destOrd="0" parTransId="{F721625A-BF04-47B9-8FE8-F6319B63F2E9}" sibTransId="{4D514DBE-7EA7-4E0C-82DB-BD5CE9853BC7}"/>
+    <dgm:cxn modelId="{DA735BC0-76E0-474D-853A-9CAFEAD6275A}" srcId="{8D939E49-1DCF-4EA5-8FAD-4C10D1706BBA}" destId="{3BD596F6-11EB-48AD-9E08-8787E5F683F7}" srcOrd="0" destOrd="0" parTransId="{F721625A-BF04-47B9-8FE8-F6319B63F2E9}" sibTransId="{4D514DBE-7EA7-4E0C-82DB-BD5CE9853BC7}"/>
     <dgm:cxn modelId="{89E7EEC8-6D59-48DE-A3C0-9EED5C714490}" type="presOf" srcId="{24A5978D-6909-40FE-907E-7396AD1AE1D2}" destId="{97535247-3BF9-4E17-BDB4-1A03A64BCCF8}" srcOrd="0" destOrd="0" presId="urn:microsoft.com/office/officeart/2005/8/layout/process1"/>
     <dgm:cxn modelId="{FDDE30D2-1DF6-4205-AD62-55C99DCBD6A7}" type="presOf" srcId="{6F5E7D44-1557-4D24-B418-71C970AD6BEF}" destId="{8B60FB5F-05B2-459A-9300-9D95BF839B98}" srcOrd="0" destOrd="0" presId="urn:microsoft.com/office/officeart/2005/8/layout/process1"/>
     <dgm:cxn modelId="{B42B22D3-A5F4-462F-8295-0AFA45E9B3DF}" srcId="{33C774CC-5ABC-4DBC-AA95-95A8E9530D0F}" destId="{079FAE3C-BF08-425F-BECA-798B744C0D11}" srcOrd="1" destOrd="0" parTransId="{A29D9133-0987-4FED-9312-D210C92FC2FD}" sibTransId="{4E8D1881-922E-437F-B010-AA1E6A222DFE}"/>
     <dgm:cxn modelId="{2DA59ED4-2DF4-407D-8000-A9FAE5F4F08C}" type="presOf" srcId="{8B4A4F78-DE25-471A-8C80-F5931F735A9D}" destId="{3CBF0380-0755-479F-9DFB-25A252235DAE}" srcOrd="1" destOrd="0" presId="urn:microsoft.com/office/officeart/2005/8/layout/process1"/>
     <dgm:cxn modelId="{CFBA6FDE-69FA-45AD-8199-996CE0013D1F}" type="presOf" srcId="{4F971BCF-6BF9-4240-BD4F-DF7FC6ED3A3C}" destId="{92C6CB1E-8AB8-417B-99FC-BDB0633FF67D}" srcOrd="0" destOrd="3" presId="urn:microsoft.com/office/officeart/2005/8/layout/process1"/>
     <dgm:cxn modelId="{D5D47EDE-44E1-49D9-A863-989628FB031C}" type="presOf" srcId="{4E8D1881-922E-437F-B010-AA1E6A222DFE}" destId="{8F0A802E-4130-4BA7-B156-F1D61C2ED953}" srcOrd="1" destOrd="0" presId="urn:microsoft.com/office/officeart/2005/8/layout/process1"/>
-    <dgm:cxn modelId="{4A1E04E2-21F6-4A6E-A12E-2F8C235FECA6}" srcId="{8D939E49-1DCF-4EA5-8FAD-4C10D1706BBA}" destId="{51F321CE-A9D2-43B2-BBC6-5D911A2C430D}" srcOrd="0" destOrd="0" parTransId="{F3C3F2C6-2B33-41DE-A224-5AB97F56CE35}" sibTransId="{B9B6FE16-BED0-4D31-81DE-5CC4ADD13DA7}"/>
     <dgm:cxn modelId="{C583BF58-51AF-40AA-B853-47C55EF7A119}" type="presParOf" srcId="{98DF7536-9BEC-484E-820A-4149F93A37D7}" destId="{8B60FB5F-05B2-459A-9300-9D95BF839B98}" srcOrd="0" destOrd="0" presId="urn:microsoft.com/office/officeart/2005/8/layout/process1"/>
     <dgm:cxn modelId="{0516B65B-0382-4155-9E38-EFAA6FB25B31}" type="presParOf" srcId="{98DF7536-9BEC-484E-820A-4149F93A37D7}" destId="{C8C2DF9B-2592-4876-8559-E8894F0B09C5}" srcOrd="1" destOrd="0" presId="urn:microsoft.com/office/officeart/2005/8/layout/process1"/>
     <dgm:cxn modelId="{EE5D305E-2F30-499A-9E9F-6BA269C18416}" type="presParOf" srcId="{C8C2DF9B-2592-4876-8559-E8894F0B09C5}" destId="{F8BF7B47-155E-4BC1-9AD2-5A3BBE6D98E3}" srcOrd="0" destOrd="0" presId="urn:microsoft.com/office/officeart/2005/8/layout/process1"/>
@@ -3144,8 +3106,8 @@
       </dsp:nvSpPr>
       <dsp:spPr>
         <a:xfrm>
-          <a:off x="5583" y="624692"/>
-          <a:ext cx="1730981" cy="2543223"/>
+          <a:off x="2339" y="787830"/>
+          <a:ext cx="1719813" cy="2216947"/>
         </a:xfrm>
         <a:prstGeom prst="roundRect">
           <a:avLst>
@@ -3188,12 +3150,12 @@
         </a:fontRef>
       </dsp:style>
       <dsp:txBody>
-        <a:bodyPr spcFirstLastPara="0" vert="horz" wrap="square" lIns="68580" tIns="68580" rIns="68580" bIns="68580" numCol="1" spcCol="1270" anchor="t" anchorCtr="0">
+        <a:bodyPr spcFirstLastPara="0" vert="horz" wrap="square" lIns="60960" tIns="60960" rIns="60960" bIns="60960" numCol="1" spcCol="1270" anchor="t" anchorCtr="0">
           <a:noAutofit/>
         </a:bodyPr>
         <a:lstStyle/>
         <a:p>
-          <a:pPr marL="0" lvl="0" indent="0" algn="l" defTabSz="800100">
+          <a:pPr marL="0" lvl="0" indent="0" algn="l" defTabSz="711200">
             <a:lnSpc>
               <a:spcPct val="90000"/>
             </a:lnSpc>
@@ -3206,12 +3168,12 @@
             <a:buNone/>
           </a:pPr>
           <a:r>
-            <a:rPr lang="en-SG" sz="1800" kern="1200" dirty="0"/>
+            <a:rPr lang="en-SG" sz="1600" kern="1200" dirty="0"/>
             <a:t>Data Sources (Unstructured — Singapore Budgets)</a:t>
           </a:r>
         </a:p>
         <a:p>
-          <a:pPr marL="114300" lvl="1" indent="-114300" algn="l" defTabSz="622300">
+          <a:pPr marL="114300" lvl="1" indent="-114300" algn="l" defTabSz="533400">
             <a:lnSpc>
               <a:spcPct val="90000"/>
             </a:lnSpc>
@@ -3224,14 +3186,14 @@
             <a:buChar char="•"/>
           </a:pPr>
           <a:r>
-            <a:rPr lang="en-SG" sz="1400" kern="1200" dirty="0"/>
-            <a:t>Budget – 2025 (multi-modal sources; e.g. pdf/html, video-to-transcript)</a:t>
+            <a:rPr lang="en-SG" sz="1200" kern="1200" dirty="0"/>
+            <a:t>10 years Budget Statements, Round-Up Speeches – FY2016 - FY2025</a:t>
           </a:r>
         </a:p>
       </dsp:txBody>
       <dsp:txXfrm>
-        <a:off x="56282" y="675391"/>
-        <a:ext cx="1629583" cy="2441825"/>
+        <a:off x="52711" y="838202"/>
+        <a:ext cx="1619069" cy="2116203"/>
       </dsp:txXfrm>
     </dsp:sp>
     <dsp:sp modelId="{C8C2DF9B-2592-4876-8559-E8894F0B09C5}">
@@ -3241,8 +3203,8 @@
       </dsp:nvSpPr>
       <dsp:spPr>
         <a:xfrm>
-          <a:off x="1909663" y="1681662"/>
-          <a:ext cx="366967" cy="429283"/>
+          <a:off x="1894134" y="1683047"/>
+          <a:ext cx="364600" cy="426513"/>
         </a:xfrm>
         <a:prstGeom prst="rightArrow">
           <a:avLst>
@@ -3284,7 +3246,7 @@
         </a:bodyPr>
         <a:lstStyle/>
         <a:p>
-          <a:pPr marL="0" lvl="0" indent="0" algn="ctr" defTabSz="622300">
+          <a:pPr marL="0" lvl="0" indent="0" algn="ctr" defTabSz="844550">
             <a:lnSpc>
               <a:spcPct val="90000"/>
             </a:lnSpc>
@@ -3296,12 +3258,12 @@
             </a:spcAft>
             <a:buNone/>
           </a:pPr>
-          <a:endParaRPr lang="en-SG" sz="1400" kern="1200" dirty="0"/>
+          <a:endParaRPr lang="en-SG" sz="1900" kern="1200" dirty="0"/>
         </a:p>
       </dsp:txBody>
       <dsp:txXfrm>
-        <a:off x="1909663" y="1767519"/>
-        <a:ext cx="256877" cy="257569"/>
+        <a:off x="1894134" y="1768350"/>
+        <a:ext cx="255220" cy="255907"/>
       </dsp:txXfrm>
     </dsp:sp>
     <dsp:sp modelId="{92C6CB1E-8AB8-417B-99FC-BDB0633FF67D}">
@@ -3311,8 +3273,8 @@
       </dsp:nvSpPr>
       <dsp:spPr>
         <a:xfrm>
-          <a:off x="2428957" y="624692"/>
-          <a:ext cx="1730981" cy="2543223"/>
+          <a:off x="2410078" y="787830"/>
+          <a:ext cx="1719813" cy="2216947"/>
         </a:xfrm>
         <a:prstGeom prst="roundRect">
           <a:avLst>
@@ -3355,12 +3317,12 @@
         </a:fontRef>
       </dsp:style>
       <dsp:txBody>
-        <a:bodyPr spcFirstLastPara="0" vert="horz" wrap="square" lIns="68580" tIns="68580" rIns="68580" bIns="68580" numCol="1" spcCol="1270" anchor="t" anchorCtr="0">
+        <a:bodyPr spcFirstLastPara="0" vert="horz" wrap="square" lIns="60960" tIns="60960" rIns="60960" bIns="60960" numCol="1" spcCol="1270" anchor="t" anchorCtr="0">
           <a:noAutofit/>
         </a:bodyPr>
         <a:lstStyle/>
         <a:p>
-          <a:pPr marL="0" lvl="0" indent="0" algn="l" defTabSz="800100">
+          <a:pPr marL="0" lvl="0" indent="0" algn="l" defTabSz="711200">
             <a:lnSpc>
               <a:spcPct val="90000"/>
             </a:lnSpc>
@@ -3373,12 +3335,12 @@
             <a:buNone/>
           </a:pPr>
           <a:r>
-            <a:rPr lang="en-SG" sz="1800" kern="1200" dirty="0"/>
+            <a:rPr lang="en-SG" sz="1600" kern="1200" dirty="0"/>
             <a:t>Ingestion &amp; Preprocessing</a:t>
           </a:r>
         </a:p>
         <a:p>
-          <a:pPr marL="114300" lvl="1" indent="-114300" algn="l" defTabSz="622300">
+          <a:pPr marL="114300" lvl="1" indent="-114300" algn="l" defTabSz="533400">
             <a:lnSpc>
               <a:spcPct val="90000"/>
             </a:lnSpc>
@@ -3391,12 +3353,12 @@
             <a:buChar char="•"/>
           </a:pPr>
           <a:r>
-            <a:rPr lang="en-SG" sz="1400" kern="1200" dirty="0"/>
-            <a:t>Selected multi-modal sources normalized to text </a:t>
+            <a:rPr lang="en-SG" sz="1200" kern="1200" dirty="0"/>
+            <a:t>Tag sources by Financial Year,  Type (Budget Statement / Round-Up Speech)</a:t>
           </a:r>
         </a:p>
         <a:p>
-          <a:pPr marL="114300" lvl="1" indent="-114300" algn="l" defTabSz="622300">
+          <a:pPr marL="114300" lvl="1" indent="-114300" algn="l" defTabSz="533400">
             <a:lnSpc>
               <a:spcPct val="90000"/>
             </a:lnSpc>
@@ -3409,12 +3371,12 @@
             <a:buChar char="•"/>
           </a:pPr>
           <a:r>
-            <a:rPr lang="en-SG" sz="1400" kern="1200" dirty="0"/>
+            <a:rPr lang="en-SG" sz="1200" kern="1200" dirty="0"/>
             <a:t>Overlapping chunking</a:t>
           </a:r>
         </a:p>
         <a:p>
-          <a:pPr marL="114300" lvl="1" indent="-114300" algn="l" defTabSz="622300">
+          <a:pPr marL="114300" lvl="1" indent="-114300" algn="l" defTabSz="533400">
             <a:lnSpc>
               <a:spcPct val="90000"/>
             </a:lnSpc>
@@ -3427,14 +3389,14 @@
             <a:buChar char="•"/>
           </a:pPr>
           <a:r>
-            <a:rPr lang="en-SG" sz="1400" kern="1200" dirty="0"/>
+            <a:rPr lang="en-SG" sz="1200" kern="1200" dirty="0"/>
             <a:t>Dense semantic embedding + Sparse lexical retrieval (BM25)</a:t>
           </a:r>
         </a:p>
       </dsp:txBody>
       <dsp:txXfrm>
-        <a:off x="2479656" y="675391"/>
-        <a:ext cx="1629583" cy="2441825"/>
+        <a:off x="2460450" y="838202"/>
+        <a:ext cx="1619069" cy="2116203"/>
       </dsp:txXfrm>
     </dsp:sp>
     <dsp:sp modelId="{5ACAF45A-2293-4DEB-A521-8230FD18B43C}">
@@ -3444,8 +3406,8 @@
       </dsp:nvSpPr>
       <dsp:spPr>
         <a:xfrm>
-          <a:off x="4333036" y="1681662"/>
-          <a:ext cx="366967" cy="429283"/>
+          <a:off x="4301873" y="1683047"/>
+          <a:ext cx="364600" cy="426513"/>
         </a:xfrm>
         <a:prstGeom prst="rightArrow">
           <a:avLst>
@@ -3487,7 +3449,7 @@
         </a:bodyPr>
         <a:lstStyle/>
         <a:p>
-          <a:pPr marL="0" lvl="0" indent="0" algn="ctr" defTabSz="622300">
+          <a:pPr marL="0" lvl="0" indent="0" algn="ctr" defTabSz="844550">
             <a:lnSpc>
               <a:spcPct val="90000"/>
             </a:lnSpc>
@@ -3499,12 +3461,12 @@
             </a:spcAft>
             <a:buNone/>
           </a:pPr>
-          <a:endParaRPr lang="en-SG" sz="1400" kern="1200" dirty="0"/>
+          <a:endParaRPr lang="en-SG" sz="1900" kern="1200" dirty="0"/>
         </a:p>
       </dsp:txBody>
       <dsp:txXfrm>
-        <a:off x="4333036" y="1767519"/>
-        <a:ext cx="256877" cy="257569"/>
+        <a:off x="4301873" y="1768350"/>
+        <a:ext cx="255220" cy="255907"/>
       </dsp:txXfrm>
     </dsp:sp>
     <dsp:sp modelId="{35E22166-92D8-4563-AFE1-94814331420D}">
@@ -3514,8 +3476,8 @@
       </dsp:nvSpPr>
       <dsp:spPr>
         <a:xfrm>
-          <a:off x="4852330" y="624692"/>
-          <a:ext cx="1730981" cy="2543223"/>
+          <a:off x="4817817" y="787830"/>
+          <a:ext cx="1719813" cy="2216947"/>
         </a:xfrm>
         <a:prstGeom prst="roundRect">
           <a:avLst>
@@ -3558,12 +3520,12 @@
         </a:fontRef>
       </dsp:style>
       <dsp:txBody>
-        <a:bodyPr spcFirstLastPara="0" vert="horz" wrap="square" lIns="68580" tIns="68580" rIns="68580" bIns="68580" numCol="1" spcCol="1270" anchor="t" anchorCtr="0">
+        <a:bodyPr spcFirstLastPara="0" vert="horz" wrap="square" lIns="60960" tIns="60960" rIns="60960" bIns="60960" numCol="1" spcCol="1270" anchor="t" anchorCtr="0">
           <a:noAutofit/>
         </a:bodyPr>
         <a:lstStyle/>
         <a:p>
-          <a:pPr marL="0" lvl="0" indent="0" algn="l" defTabSz="800100">
+          <a:pPr marL="0" lvl="0" indent="0" algn="l" defTabSz="711200">
             <a:lnSpc>
               <a:spcPct val="90000"/>
             </a:lnSpc>
@@ -3576,12 +3538,12 @@
             <a:buNone/>
           </a:pPr>
           <a:r>
-            <a:rPr lang="en-SG" sz="1800" kern="1200" dirty="0"/>
+            <a:rPr lang="en-SG" sz="1600" kern="1200" dirty="0"/>
             <a:t>Knowledge Stores</a:t>
           </a:r>
         </a:p>
         <a:p>
-          <a:pPr marL="114300" lvl="1" indent="-114300" algn="l" defTabSz="622300">
+          <a:pPr marL="114300" lvl="1" indent="-114300" algn="l" defTabSz="533400">
             <a:lnSpc>
               <a:spcPct val="90000"/>
             </a:lnSpc>
@@ -3595,14 +3557,14 @@
             <a:buChar char="•"/>
           </a:pPr>
           <a:r>
-            <a:rPr lang="en-SG" sz="1400" kern="1200" dirty="0"/>
+            <a:rPr lang="en-SG" sz="1200" kern="1200" dirty="0"/>
             <a:t>Vector DB</a:t>
           </a:r>
         </a:p>
       </dsp:txBody>
       <dsp:txXfrm>
-        <a:off x="4903029" y="675391"/>
-        <a:ext cx="1629583" cy="2441825"/>
+        <a:off x="4868189" y="838202"/>
+        <a:ext cx="1619069" cy="2116203"/>
       </dsp:txXfrm>
     </dsp:sp>
     <dsp:sp modelId="{97535247-3BF9-4E17-BDB4-1A03A64BCCF8}">
@@ -3611,9 +3573,9 @@
         <dsp:cNvSpPr/>
       </dsp:nvSpPr>
       <dsp:spPr>
-        <a:xfrm rot="21591967">
-          <a:off x="6765464" y="1678763"/>
-          <a:ext cx="386165" cy="429283"/>
+        <a:xfrm rot="21593065">
+          <a:off x="6718608" y="1680561"/>
+          <a:ext cx="383673" cy="426513"/>
         </a:xfrm>
         <a:prstGeom prst="rightArrow">
           <a:avLst>
@@ -3655,7 +3617,7 @@
         </a:bodyPr>
         <a:lstStyle/>
         <a:p>
-          <a:pPr marL="0" lvl="0" indent="0" algn="ctr" defTabSz="622300">
+          <a:pPr marL="0" lvl="0" indent="0" algn="ctr" defTabSz="844550">
             <a:lnSpc>
               <a:spcPct val="90000"/>
             </a:lnSpc>
@@ -3667,12 +3629,12 @@
             </a:spcAft>
             <a:buNone/>
           </a:pPr>
-          <a:endParaRPr lang="en-SG" sz="1400" kern="1200" dirty="0"/>
+          <a:endParaRPr lang="en-SG" sz="1900" kern="1200" dirty="0"/>
         </a:p>
       </dsp:txBody>
       <dsp:txXfrm>
-        <a:off x="6765464" y="1764755"/>
-        <a:ext cx="270316" cy="257569"/>
+        <a:off x="6718608" y="1765980"/>
+        <a:ext cx="268571" cy="255907"/>
       </dsp:txXfrm>
     </dsp:sp>
     <dsp:sp modelId="{35C9A030-F680-4047-A5AD-E01589EA65AB}">
@@ -3682,8 +3644,8 @@
       </dsp:nvSpPr>
       <dsp:spPr>
         <a:xfrm>
-          <a:off x="7311923" y="619097"/>
-          <a:ext cx="1730981" cy="2542918"/>
+          <a:off x="7261541" y="782953"/>
+          <a:ext cx="1800008" cy="2216681"/>
         </a:xfrm>
         <a:prstGeom prst="roundRect">
           <a:avLst>
@@ -3726,12 +3688,12 @@
         </a:fontRef>
       </dsp:style>
       <dsp:txBody>
-        <a:bodyPr spcFirstLastPara="0" vert="horz" wrap="square" lIns="64770" tIns="64770" rIns="64770" bIns="64770" numCol="1" spcCol="1270" anchor="t" anchorCtr="0">
+        <a:bodyPr spcFirstLastPara="0" vert="horz" wrap="square" lIns="60960" tIns="60960" rIns="60960" bIns="60960" numCol="1" spcCol="1270" anchor="t" anchorCtr="0">
           <a:noAutofit/>
         </a:bodyPr>
         <a:lstStyle/>
         <a:p>
-          <a:pPr marL="0" lvl="0" indent="0" algn="l" defTabSz="755650">
+          <a:pPr marL="0" lvl="0" indent="0" algn="l" defTabSz="711200">
             <a:lnSpc>
               <a:spcPct val="90000"/>
             </a:lnSpc>
@@ -3744,30 +3706,12 @@
             <a:buNone/>
           </a:pPr>
           <a:r>
-            <a:rPr lang="en-SG" sz="1700" kern="1200" dirty="0"/>
-            <a:t>RAG &amp; Agentic AI</a:t>
-          </a:r>
-        </a:p>
-        <a:p>
-          <a:pPr marL="114300" lvl="1" indent="-114300" algn="l" defTabSz="577850">
-            <a:lnSpc>
-              <a:spcPct val="90000"/>
-            </a:lnSpc>
-            <a:spcBef>
-              <a:spcPct val="0"/>
-            </a:spcBef>
-            <a:spcAft>
-              <a:spcPct val="15000"/>
-            </a:spcAft>
-            <a:buChar char="•"/>
-          </a:pPr>
-          <a:r>
-            <a:rPr lang="en-SG" sz="1300" b="1" kern="1200" dirty="0"/>
+            <a:rPr lang="en-SG" sz="1600" kern="1200" dirty="0"/>
             <a:t>RAG &amp; Agentic AI Orchestration</a:t>
           </a:r>
         </a:p>
         <a:p>
-          <a:pPr marL="114300" lvl="1" indent="-114300" algn="l" defTabSz="577850">
+          <a:pPr marL="114300" lvl="1" indent="-114300" algn="l" defTabSz="533400">
             <a:lnSpc>
               <a:spcPct val="90000"/>
             </a:lnSpc>
@@ -3781,15 +3725,15 @@
             <a:buChar char="•"/>
           </a:pPr>
           <a:r>
-            <a:rPr lang="en-SG" sz="1300" kern="1200" dirty="0"/>
+            <a:rPr lang="en-SG" sz="1200" kern="1200" dirty="0"/>
             <a:t>With re-ranking retrieval (cross-encoder transformers, non-LLM)</a:t>
           </a:r>
-          <a:endParaRPr lang="en-SG" sz="1300" b="1" kern="1200" dirty="0"/>
+          <a:endParaRPr lang="en-SG" sz="1200" b="1" kern="1200" dirty="0"/>
         </a:p>
       </dsp:txBody>
       <dsp:txXfrm>
-        <a:off x="7362622" y="669796"/>
-        <a:ext cx="1629583" cy="2441520"/>
+        <a:off x="7314261" y="835673"/>
+        <a:ext cx="1694568" cy="2111241"/>
       </dsp:txXfrm>
     </dsp:sp>
     <dsp:sp modelId="{7894FAD1-982C-4135-BFAC-AAC3B729DCE7}">
@@ -3798,9 +3742,9 @@
         <dsp:cNvSpPr/>
       </dsp:nvSpPr>
       <dsp:spPr>
-        <a:xfrm rot="8277">
-          <a:off x="9206947" y="1678812"/>
-          <a:ext cx="347772" cy="429283"/>
+        <a:xfrm rot="7141">
+          <a:off x="9224534" y="1680604"/>
+          <a:ext cx="345528" cy="426513"/>
         </a:xfrm>
         <a:prstGeom prst="rightArrow">
           <a:avLst>
@@ -3842,7 +3786,7 @@
         </a:bodyPr>
         <a:lstStyle/>
         <a:p>
-          <a:pPr marL="0" lvl="0" indent="0" algn="ctr" defTabSz="622300">
+          <a:pPr marL="0" lvl="0" indent="0" algn="ctr" defTabSz="844550">
             <a:lnSpc>
               <a:spcPct val="90000"/>
             </a:lnSpc>
@@ -3854,12 +3798,12 @@
             </a:spcAft>
             <a:buNone/>
           </a:pPr>
-          <a:endParaRPr lang="en-SG" sz="1400" kern="1200" dirty="0"/>
+          <a:endParaRPr lang="en-SG" sz="1900" kern="1200" dirty="0"/>
         </a:p>
       </dsp:txBody>
       <dsp:txXfrm>
-        <a:off x="9206947" y="1764543"/>
-        <a:ext cx="243440" cy="257569"/>
+        <a:off x="9224534" y="1765799"/>
+        <a:ext cx="241870" cy="255907"/>
       </dsp:txXfrm>
     </dsp:sp>
     <dsp:sp modelId="{C16203E6-504B-4580-8F87-8CBB85053497}">
@@ -3869,8 +3813,8 @@
       </dsp:nvSpPr>
       <dsp:spPr>
         <a:xfrm>
-          <a:off x="9699078" y="624692"/>
-          <a:ext cx="1730981" cy="2543223"/>
+          <a:off x="9713489" y="787830"/>
+          <a:ext cx="1719813" cy="2216947"/>
         </a:xfrm>
         <a:prstGeom prst="roundRect">
           <a:avLst>
@@ -3913,12 +3857,12 @@
         </a:fontRef>
       </dsp:style>
       <dsp:txBody>
-        <a:bodyPr spcFirstLastPara="0" vert="horz" wrap="square" lIns="68580" tIns="68580" rIns="68580" bIns="68580" numCol="1" spcCol="1270" anchor="ctr" anchorCtr="0">
+        <a:bodyPr spcFirstLastPara="0" vert="horz" wrap="square" lIns="60960" tIns="60960" rIns="60960" bIns="60960" numCol="1" spcCol="1270" anchor="ctr" anchorCtr="0">
           <a:noAutofit/>
         </a:bodyPr>
         <a:lstStyle/>
         <a:p>
-          <a:pPr marL="0" lvl="0" indent="0" algn="ctr" defTabSz="800100">
+          <a:pPr marL="0" lvl="0" indent="0" algn="ctr" defTabSz="711200">
             <a:lnSpc>
               <a:spcPct val="90000"/>
             </a:lnSpc>
@@ -3931,14 +3875,14 @@
             <a:buNone/>
           </a:pPr>
           <a:r>
-            <a:rPr lang="en-SG" sz="1800" kern="1200" dirty="0"/>
+            <a:rPr lang="en-SG" sz="1600" kern="1200" dirty="0"/>
             <a:t>Response</a:t>
           </a:r>
         </a:p>
       </dsp:txBody>
       <dsp:txXfrm>
-        <a:off x="9749777" y="675391"/>
-        <a:ext cx="1629583" cy="2441825"/>
+        <a:off x="9763861" y="838202"/>
+        <a:ext cx="1619069" cy="2116203"/>
       </dsp:txXfrm>
     </dsp:sp>
   </dsp:spTree>
@@ -12080,7 +12024,7 @@
           <p:nvPr>
             <p:extLst>
               <p:ext uri="{D42A27DB-BD31-4B8C-83A1-F6EECF244321}">
-                <p14:modId xmlns:p14="http://schemas.microsoft.com/office/powerpoint/2010/main" val="2269382657"/>
+                <p14:modId xmlns:p14="http://schemas.microsoft.com/office/powerpoint/2010/main" val="2073954410"/>
               </p:ext>
             </p:extLst>
           </p:nvPr>
@@ -12125,7 +12069,7 @@
           <a:p>
             <a:r>
               <a:rPr lang="en-SG" i="1" dirty="0"/>
-              <a:t>Key Goal: Chatbot with responses grounded with relevant chunks from curated set of publicly available Singapore Budget Documents (selective multi-modal conversion to text)</a:t>
+              <a:t>Key Goal: Chatbot with responses grounded with relevant chunks from curated set of publicly available Singapore Budget Statements</a:t>
             </a:r>
           </a:p>
         </p:txBody>
@@ -12693,7 +12637,7 @@
                 <a:buNone/>
               </a:pPr>
               <a:r>
-                <a:rPr lang="en-SG" dirty="0"/>
+                <a:rPr lang="en-SG" sz="1600" dirty="0"/>
                 <a:t>User</a:t>
               </a:r>
             </a:p>
@@ -12712,10 +12656,10 @@
                 <a:buChar char="•"/>
               </a:pPr>
               <a:r>
-                <a:rPr lang="en-SG" sz="1000" dirty="0"/>
+                <a:rPr lang="en-SG" sz="1200" dirty="0"/>
                 <a:t>API + UI</a:t>
               </a:r>
-              <a:endParaRPr lang="en-SG" sz="1000" kern="1200" dirty="0"/>
+              <a:endParaRPr lang="en-SG" sz="1200" kern="1200" dirty="0"/>
             </a:p>
           </p:txBody>
         </p:sp>
@@ -12909,6 +12853,44 @@
           <a:p>
             <a:pPr algn="ctr"/>
             <a:endParaRPr lang="en-SG" dirty="0"/>
+          </a:p>
+        </p:txBody>
+      </p:sp>
+      <p:sp>
+        <p:nvSpPr>
+          <p:cNvPr id="14" name="TextBox 13">
+            <a:extLst>
+              <a:ext uri="{FF2B5EF4-FFF2-40B4-BE49-F238E27FC236}">
+                <a16:creationId xmlns:a16="http://schemas.microsoft.com/office/drawing/2014/main" id="{CDF685A2-DDE9-2521-C6C6-1537FC0EF46F}"/>
+              </a:ext>
+            </a:extLst>
+          </p:cNvPr>
+          <p:cNvSpPr txBox="1"/>
+          <p:nvPr/>
+        </p:nvSpPr>
+        <p:spPr>
+          <a:xfrm>
+            <a:off x="357412" y="5256011"/>
+            <a:ext cx="2115569" cy="523220"/>
+          </a:xfrm>
+          <a:prstGeom prst="rect">
+            <a:avLst/>
+          </a:prstGeom>
+          <a:noFill/>
+        </p:spPr>
+        <p:txBody>
+          <a:bodyPr wrap="square">
+            <a:spAutoFit/>
+          </a:bodyPr>
+          <a:lstStyle/>
+          <a:p>
+            <a:r>
+              <a:rPr lang="en-SG" sz="1400" i="1" dirty="0">
+                <a:hlinkClick r:id="rId18"/>
+              </a:rPr>
+              <a:t>Budget Archives | Ministry of Finance (MOF)</a:t>
+            </a:r>
+            <a:endParaRPr lang="en-SG" sz="1400" i="1" dirty="0"/>
           </a:p>
         </p:txBody>
       </p:sp>

</xml_diff>

<commit_message>
updated math documentation and slide, checkpoint before deploy vercel
</commit_message>
<xml_diff>
--- a/docs/system_architecture.pptx
+++ b/docs/system_architecture.pptx
@@ -5,13 +5,14 @@
     <p:sldMasterId id="2147483660" r:id="rId1"/>
   </p:sldMasterIdLst>
   <p:notesMasterIdLst>
-    <p:notesMasterId r:id="rId6"/>
+    <p:notesMasterId r:id="rId7"/>
   </p:notesMasterIdLst>
   <p:sldIdLst>
     <p:sldId id="260" r:id="rId2"/>
     <p:sldId id="258" r:id="rId3"/>
     <p:sldId id="259" r:id="rId4"/>
-    <p:sldId id="261" r:id="rId5"/>
+    <p:sldId id="262" r:id="rId5"/>
+    <p:sldId id="261" r:id="rId6"/>
   </p:sldIdLst>
   <p:sldSz cx="12192000" cy="6858000"/>
   <p:notesSz cx="6858000" cy="9144000"/>
@@ -111,6 +112,23 @@
     </a:lvl9pPr>
   </p:defaultTextStyle>
   <p:extLst>
+    <p:ext uri="{521415D9-36F7-43E2-AB2F-B90AF26B5E84}">
+      <p14:sectionLst xmlns:p14="http://schemas.microsoft.com/office/powerpoint/2010/main">
+        <p14:section name="Default Section" id="{FC54DA0C-8B6E-4887-85F2-7BA7E28D98A6}">
+          <p14:sldIdLst>
+            <p14:sldId id="260"/>
+            <p14:sldId id="258"/>
+            <p14:sldId id="259"/>
+          </p14:sldIdLst>
+        </p14:section>
+        <p14:section name="Key Algorithm" id="{FC6F502C-BCB0-4E8E-B6F1-A2E6C8A60000}">
+          <p14:sldIdLst>
+            <p14:sldId id="262"/>
+            <p14:sldId id="261"/>
+          </p14:sldIdLst>
+        </p14:section>
+      </p14:sectionLst>
+    </p:ext>
     <p:ext uri="{EFAFB233-063F-42B5-8137-9DF3F51BA10A}">
       <p15:sldGuideLst xmlns:p15="http://schemas.microsoft.com/office/powerpoint/2012/main"/>
     </p:ext>
@@ -1186,7 +1204,7 @@
         <a:p>
           <a:r>
             <a:rPr lang="en-SG" sz="1200" dirty="0"/>
-            <a:t>Dense semantic embedding + Sparse lexical retrieval (BM25)</a:t>
+            <a:t>Dense semantic embedding + Sparse lexical retrieval (BM25-style)</a:t>
           </a:r>
         </a:p>
       </dgm:t>
@@ -1879,7 +1897,7 @@
           </a:pPr>
           <a:r>
             <a:rPr lang="en-SG" sz="1200" kern="1200" dirty="0"/>
-            <a:t>Dense semantic embedding + Sparse lexical retrieval (BM25)</a:t>
+            <a:t>Dense semantic embedding + Sparse lexical retrieval (BM25-style)</a:t>
           </a:r>
         </a:p>
       </dsp:txBody>
@@ -3712,7 +3730,7 @@
           <a:p>
             <a:fld id="{FC211DB0-4CAC-4D90-907F-FD24F16BC89C}" type="datetimeFigureOut">
               <a:rPr lang="en-SG" smtClean="0"/>
-              <a:t>9/2/2026</a:t>
+              <a:t>10/2/2026</a:t>
             </a:fld>
             <a:endParaRPr lang="en-SG" dirty="0"/>
           </a:p>
@@ -4285,6 +4303,121 @@
         <p:cNvPr id="1" name="">
           <a:extLst>
             <a:ext uri="{FF2B5EF4-FFF2-40B4-BE49-F238E27FC236}">
+              <a16:creationId xmlns:a16="http://schemas.microsoft.com/office/drawing/2014/main" id="{1F76F63F-D9BD-DE22-D67B-0C691B04FFEC}"/>
+            </a:ext>
+          </a:extLst>
+        </p:cNvPr>
+        <p:cNvGrpSpPr/>
+        <p:nvPr/>
+      </p:nvGrpSpPr>
+      <p:grpSpPr>
+        <a:xfrm>
+          <a:off x="0" y="0"/>
+          <a:ext cx="0" cy="0"/>
+          <a:chOff x="0" y="0"/>
+          <a:chExt cx="0" cy="0"/>
+        </a:xfrm>
+      </p:grpSpPr>
+      <p:sp>
+        <p:nvSpPr>
+          <p:cNvPr id="2" name="Slide Image Placeholder 1">
+            <a:extLst>
+              <a:ext uri="{FF2B5EF4-FFF2-40B4-BE49-F238E27FC236}">
+                <a16:creationId xmlns:a16="http://schemas.microsoft.com/office/drawing/2014/main" id="{F87F160B-16EB-F0C5-675E-FA8CE35FD1A4}"/>
+              </a:ext>
+            </a:extLst>
+          </p:cNvPr>
+          <p:cNvSpPr>
+            <a:spLocks noGrp="1" noRot="1" noChangeAspect="1"/>
+          </p:cNvSpPr>
+          <p:nvPr>
+            <p:ph type="sldImg"/>
+          </p:nvPr>
+        </p:nvSpPr>
+        <p:spPr/>
+        <p:txBody>
+          <a:bodyPr/>
+          <a:lstStyle/>
+          <a:p>
+            <a:endParaRPr lang="en-SG" dirty="0"/>
+          </a:p>
+        </p:txBody>
+      </p:sp>
+      <p:sp>
+        <p:nvSpPr>
+          <p:cNvPr id="3" name="Notes Placeholder 2">
+            <a:extLst>
+              <a:ext uri="{FF2B5EF4-FFF2-40B4-BE49-F238E27FC236}">
+                <a16:creationId xmlns:a16="http://schemas.microsoft.com/office/drawing/2014/main" id="{F7A67F33-9429-5FB5-7107-9951A2C7397D}"/>
+              </a:ext>
+            </a:extLst>
+          </p:cNvPr>
+          <p:cNvSpPr>
+            <a:spLocks noGrp="1"/>
+          </p:cNvSpPr>
+          <p:nvPr>
+            <p:ph type="body" idx="1"/>
+          </p:nvPr>
+        </p:nvSpPr>
+        <p:spPr/>
+        <p:txBody>
+          <a:bodyPr/>
+          <a:lstStyle/>
+          <a:p>
+            <a:endParaRPr lang="en-SG" dirty="0"/>
+          </a:p>
+        </p:txBody>
+      </p:sp>
+      <p:sp>
+        <p:nvSpPr>
+          <p:cNvPr id="4" name="Slide Number Placeholder 3">
+            <a:extLst>
+              <a:ext uri="{FF2B5EF4-FFF2-40B4-BE49-F238E27FC236}">
+                <a16:creationId xmlns:a16="http://schemas.microsoft.com/office/drawing/2014/main" id="{E1AFE0A6-4298-748E-FC4B-60CA848C1EBF}"/>
+              </a:ext>
+            </a:extLst>
+          </p:cNvPr>
+          <p:cNvSpPr>
+            <a:spLocks noGrp="1"/>
+          </p:cNvSpPr>
+          <p:nvPr>
+            <p:ph type="sldNum" sz="quarter" idx="5"/>
+          </p:nvPr>
+        </p:nvSpPr>
+        <p:spPr/>
+        <p:txBody>
+          <a:bodyPr/>
+          <a:lstStyle/>
+          <a:p>
+            <a:fld id="{09A4FB01-E6F3-460D-8523-1D01053AD545}" type="slidenum">
+              <a:rPr lang="en-SG" smtClean="0"/>
+              <a:t>4</a:t>
+            </a:fld>
+            <a:endParaRPr lang="en-SG" dirty="0"/>
+          </a:p>
+        </p:txBody>
+      </p:sp>
+    </p:spTree>
+    <p:extLst>
+      <p:ext uri="{BB962C8B-B14F-4D97-AF65-F5344CB8AC3E}">
+        <p14:creationId xmlns:p14="http://schemas.microsoft.com/office/powerpoint/2010/main" val="406816133"/>
+      </p:ext>
+    </p:extLst>
+  </p:cSld>
+  <p:clrMapOvr>
+    <a:masterClrMapping/>
+  </p:clrMapOvr>
+</p:notes>
+</file>
+
+<file path=ppt/notesSlides/notesSlide5.xml><?xml version="1.0" encoding="utf-8"?>
+<p:notes xmlns:a="http://schemas.openxmlformats.org/drawingml/2006/main" xmlns:r="http://schemas.openxmlformats.org/officeDocument/2006/relationships" xmlns:p="http://schemas.openxmlformats.org/presentationml/2006/main">
+  <p:cSld>
+    <p:spTree>
+      <p:nvGrpSpPr>
+        <p:cNvPr id="1" name="">
+          <a:extLst>
+            <a:ext uri="{FF2B5EF4-FFF2-40B4-BE49-F238E27FC236}">
               <a16:creationId xmlns:a16="http://schemas.microsoft.com/office/drawing/2014/main" id="{7CED1C44-BE08-3592-69BD-55C8DBB2C5FA}"/>
             </a:ext>
           </a:extLst>
@@ -4373,7 +4506,7 @@
           <a:p>
             <a:fld id="{09A4FB01-E6F3-460D-8523-1D01053AD545}" type="slidenum">
               <a:rPr lang="en-SG" smtClean="0"/>
-              <a:t>4</a:t>
+              <a:t>5</a:t>
             </a:fld>
             <a:endParaRPr lang="en-SG" dirty="0"/>
           </a:p>
@@ -4531,7 +4664,7 @@
           <a:p>
             <a:fld id="{893A27CD-D406-492E-A632-D285B7EF3DB9}" type="datetimeFigureOut">
               <a:rPr lang="en-SG" smtClean="0"/>
-              <a:t>9/2/2026</a:t>
+              <a:t>10/2/2026</a:t>
             </a:fld>
             <a:endParaRPr lang="en-SG" dirty="0"/>
           </a:p>
@@ -4742,7 +4875,7 @@
           <a:p>
             <a:fld id="{893A27CD-D406-492E-A632-D285B7EF3DB9}" type="datetimeFigureOut">
               <a:rPr lang="en-SG" smtClean="0"/>
-              <a:t>9/2/2026</a:t>
+              <a:t>10/2/2026</a:t>
             </a:fld>
             <a:endParaRPr lang="en-SG" dirty="0"/>
           </a:p>
@@ -4957,7 +5090,7 @@
           <a:p>
             <a:fld id="{893A27CD-D406-492E-A632-D285B7EF3DB9}" type="datetimeFigureOut">
               <a:rPr lang="en-SG" smtClean="0"/>
-              <a:t>9/2/2026</a:t>
+              <a:t>10/2/2026</a:t>
             </a:fld>
             <a:endParaRPr lang="en-SG" dirty="0"/>
           </a:p>
@@ -5158,7 +5291,7 @@
           <a:p>
             <a:fld id="{893A27CD-D406-492E-A632-D285B7EF3DB9}" type="datetimeFigureOut">
               <a:rPr lang="en-SG" smtClean="0"/>
-              <a:t>9/2/2026</a:t>
+              <a:t>10/2/2026</a:t>
             </a:fld>
             <a:endParaRPr lang="en-SG" dirty="0"/>
           </a:p>
@@ -5437,7 +5570,7 @@
           <a:p>
             <a:fld id="{893A27CD-D406-492E-A632-D285B7EF3DB9}" type="datetimeFigureOut">
               <a:rPr lang="en-SG" smtClean="0"/>
-              <a:t>9/2/2026</a:t>
+              <a:t>10/2/2026</a:t>
             </a:fld>
             <a:endParaRPr lang="en-SG" dirty="0"/>
           </a:p>
@@ -5705,7 +5838,7 @@
           <a:p>
             <a:fld id="{893A27CD-D406-492E-A632-D285B7EF3DB9}" type="datetimeFigureOut">
               <a:rPr lang="en-SG" smtClean="0"/>
-              <a:t>9/2/2026</a:t>
+              <a:t>10/2/2026</a:t>
             </a:fld>
             <a:endParaRPr lang="en-SG" dirty="0"/>
           </a:p>
@@ -6121,7 +6254,7 @@
           <a:p>
             <a:fld id="{893A27CD-D406-492E-A632-D285B7EF3DB9}" type="datetimeFigureOut">
               <a:rPr lang="en-SG" smtClean="0"/>
-              <a:t>9/2/2026</a:t>
+              <a:t>10/2/2026</a:t>
             </a:fld>
             <a:endParaRPr lang="en-SG" dirty="0"/>
           </a:p>
@@ -6270,7 +6403,7 @@
           <a:p>
             <a:fld id="{893A27CD-D406-492E-A632-D285B7EF3DB9}" type="datetimeFigureOut">
               <a:rPr lang="en-SG" smtClean="0"/>
-              <a:t>9/2/2026</a:t>
+              <a:t>10/2/2026</a:t>
             </a:fld>
             <a:endParaRPr lang="en-SG" dirty="0"/>
           </a:p>
@@ -6396,7 +6529,7 @@
           <a:p>
             <a:fld id="{893A27CD-D406-492E-A632-D285B7EF3DB9}" type="datetimeFigureOut">
               <a:rPr lang="en-SG" smtClean="0"/>
-              <a:t>9/2/2026</a:t>
+              <a:t>10/2/2026</a:t>
             </a:fld>
             <a:endParaRPr lang="en-SG" dirty="0"/>
           </a:p>
@@ -6647,7 +6780,7 @@
           <a:p>
             <a:fld id="{893A27CD-D406-492E-A632-D285B7EF3DB9}" type="datetimeFigureOut">
               <a:rPr lang="en-SG" smtClean="0"/>
-              <a:t>9/2/2026</a:t>
+              <a:t>10/2/2026</a:t>
             </a:fld>
             <a:endParaRPr lang="en-SG" dirty="0"/>
           </a:p>
@@ -7105,7 +7238,7 @@
           <a:p>
             <a:fld id="{893A27CD-D406-492E-A632-D285B7EF3DB9}" type="datetimeFigureOut">
               <a:rPr lang="en-SG" smtClean="0"/>
-              <a:t>9/2/2026</a:t>
+              <a:t>10/2/2026</a:t>
             </a:fld>
             <a:endParaRPr lang="en-SG" dirty="0"/>
           </a:p>
@@ -7439,7 +7572,7 @@
           <a:p>
             <a:fld id="{893A27CD-D406-492E-A632-D285B7EF3DB9}" type="datetimeFigureOut">
               <a:rPr lang="en-SG" smtClean="0"/>
-              <a:t>9/2/2026</a:t>
+              <a:t>10/2/2026</a:t>
             </a:fld>
             <a:endParaRPr lang="en-SG" dirty="0"/>
           </a:p>
@@ -8170,7 +8303,7 @@
           <p:nvPr>
             <p:extLst>
               <p:ext uri="{D42A27DB-BD31-4B8C-83A1-F6EECF244321}">
-                <p14:modId xmlns:p14="http://schemas.microsoft.com/office/powerpoint/2010/main" val="4050435161"/>
+                <p14:modId xmlns:p14="http://schemas.microsoft.com/office/powerpoint/2010/main" val="209407742"/>
               </p:ext>
             </p:extLst>
           </p:nvPr>
@@ -12130,6 +12263,582 @@
         <p:cNvPr id="1" name="">
           <a:extLst>
             <a:ext uri="{FF2B5EF4-FFF2-40B4-BE49-F238E27FC236}">
+              <a16:creationId xmlns:a16="http://schemas.microsoft.com/office/drawing/2014/main" id="{23ACA510-FE56-1FCC-3426-F549BE9489EB}"/>
+            </a:ext>
+          </a:extLst>
+        </p:cNvPr>
+        <p:cNvGrpSpPr/>
+        <p:nvPr/>
+      </p:nvGrpSpPr>
+      <p:grpSpPr>
+        <a:xfrm>
+          <a:off x="0" y="0"/>
+          <a:ext cx="0" cy="0"/>
+          <a:chOff x="0" y="0"/>
+          <a:chExt cx="0" cy="0"/>
+        </a:xfrm>
+      </p:grpSpPr>
+      <p:sp>
+        <p:nvSpPr>
+          <p:cNvPr id="2" name="Title 1">
+            <a:extLst>
+              <a:ext uri="{FF2B5EF4-FFF2-40B4-BE49-F238E27FC236}">
+                <a16:creationId xmlns:a16="http://schemas.microsoft.com/office/drawing/2014/main" id="{62076918-BDA9-9384-774A-97EF8C3A5297}"/>
+              </a:ext>
+            </a:extLst>
+          </p:cNvPr>
+          <p:cNvSpPr>
+            <a:spLocks noGrp="1"/>
+          </p:cNvSpPr>
+          <p:nvPr>
+            <p:ph type="title"/>
+          </p:nvPr>
+        </p:nvSpPr>
+        <p:spPr/>
+        <p:txBody>
+          <a:bodyPr/>
+          <a:lstStyle/>
+          <a:p>
+            <a:r>
+              <a:rPr lang="en-SG" dirty="0"/>
+              <a:t>System Architecture</a:t>
+            </a:r>
+          </a:p>
+        </p:txBody>
+      </p:sp>
+      <p:sp>
+        <p:nvSpPr>
+          <p:cNvPr id="112" name="TextBox 111">
+            <a:extLst>
+              <a:ext uri="{FF2B5EF4-FFF2-40B4-BE49-F238E27FC236}">
+                <a16:creationId xmlns:a16="http://schemas.microsoft.com/office/drawing/2014/main" id="{25B7D740-0C6B-7A4E-6947-D4082878E098}"/>
+              </a:ext>
+            </a:extLst>
+          </p:cNvPr>
+          <p:cNvSpPr txBox="1"/>
+          <p:nvPr/>
+        </p:nvSpPr>
+        <p:spPr>
+          <a:xfrm>
+            <a:off x="1451579" y="1469398"/>
+            <a:ext cx="8463946" cy="369332"/>
+          </a:xfrm>
+          <a:prstGeom prst="rect">
+            <a:avLst/>
+          </a:prstGeom>
+          <a:noFill/>
+        </p:spPr>
+        <p:txBody>
+          <a:bodyPr wrap="square" rtlCol="0">
+            <a:spAutoFit/>
+          </a:bodyPr>
+          <a:lstStyle/>
+          <a:p>
+            <a:r>
+              <a:rPr lang="en-SG" dirty="0"/>
+              <a:t>Hybrid Retrieval: Semantic Understanding + Keyword Grounding</a:t>
+            </a:r>
+          </a:p>
+        </p:txBody>
+      </p:sp>
+      <p:sp>
+        <p:nvSpPr>
+          <p:cNvPr id="14" name="TextBox 13">
+            <a:extLst>
+              <a:ext uri="{FF2B5EF4-FFF2-40B4-BE49-F238E27FC236}">
+                <a16:creationId xmlns:a16="http://schemas.microsoft.com/office/drawing/2014/main" id="{E1461253-D18C-ABFA-A0DB-41FCDA60BACA}"/>
+              </a:ext>
+            </a:extLst>
+          </p:cNvPr>
+          <p:cNvSpPr txBox="1"/>
+          <p:nvPr/>
+        </p:nvSpPr>
+        <p:spPr>
+          <a:xfrm>
+            <a:off x="228600" y="1904867"/>
+            <a:ext cx="3676650" cy="3600986"/>
+          </a:xfrm>
+          <a:prstGeom prst="rect">
+            <a:avLst/>
+          </a:prstGeom>
+          <a:solidFill>
+            <a:schemeClr val="accent6">
+              <a:lumMod val="40000"/>
+              <a:lumOff val="60000"/>
+            </a:schemeClr>
+          </a:solidFill>
+        </p:spPr>
+        <p:txBody>
+          <a:bodyPr wrap="square">
+            <a:spAutoFit/>
+          </a:bodyPr>
+          <a:lstStyle/>
+          <a:p>
+            <a:r>
+              <a:rPr lang="en-SG" sz="1200" b="1" dirty="0"/>
+              <a:t>Dense semantic embedding</a:t>
+            </a:r>
+          </a:p>
+          <a:p>
+            <a:pPr marL="285750" indent="-285750">
+              <a:buFont typeface="Wingdings" panose="05000000000000000000" pitchFamily="2" charset="2"/>
+              <a:buChar char="Ø"/>
+            </a:pPr>
+            <a:r>
+              <a:rPr lang="en-SG" sz="1200" b="1" dirty="0"/>
+              <a:t>Purpose:</a:t>
+            </a:r>
+            <a:r>
+              <a:rPr lang="en-SG" sz="1200" dirty="0"/>
+              <a:t> Natural language understanding for encoding and retrieval</a:t>
+            </a:r>
+          </a:p>
+          <a:p>
+            <a:pPr marL="285750" indent="-285750">
+              <a:buFont typeface="Wingdings" panose="05000000000000000000" pitchFamily="2" charset="2"/>
+              <a:buChar char="Ø"/>
+            </a:pPr>
+            <a:endParaRPr lang="en-SG" sz="1200" dirty="0"/>
+          </a:p>
+          <a:p>
+            <a:pPr marL="285750" indent="-285750">
+              <a:buFont typeface="Wingdings" panose="05000000000000000000" pitchFamily="2" charset="2"/>
+              <a:buChar char="Ø"/>
+            </a:pPr>
+            <a:r>
+              <a:rPr lang="en-SG" sz="1200" b="1" dirty="0"/>
+              <a:t>Model choice:</a:t>
+            </a:r>
+            <a:r>
+              <a:rPr lang="en-SG" sz="1200" dirty="0"/>
+              <a:t> </a:t>
+            </a:r>
+            <a:r>
+              <a:rPr lang="en-SG" sz="1200" i="1" dirty="0"/>
+              <a:t>SentenceTransformer </a:t>
+            </a:r>
+            <a:r>
+              <a:rPr lang="en-SG" sz="1200" dirty="0"/>
+              <a:t>python library</a:t>
+            </a:r>
+            <a:endParaRPr lang="en-SG" sz="1200" i="1" dirty="0"/>
+          </a:p>
+          <a:p>
+            <a:pPr marL="285750" indent="-285750">
+              <a:buFont typeface="Wingdings" panose="05000000000000000000" pitchFamily="2" charset="2"/>
+              <a:buChar char="Ø"/>
+            </a:pPr>
+            <a:endParaRPr lang="en-SG" sz="1200" dirty="0"/>
+          </a:p>
+          <a:p>
+            <a:pPr marL="285750" indent="-285750">
+              <a:buFont typeface="Wingdings" panose="05000000000000000000" pitchFamily="2" charset="2"/>
+              <a:buChar char="Ø"/>
+            </a:pPr>
+            <a:r>
+              <a:rPr lang="en-SG" sz="1200" b="1" dirty="0"/>
+              <a:t>How:</a:t>
+            </a:r>
+          </a:p>
+          <a:p>
+            <a:pPr marL="742950" lvl="1" indent="-285750">
+              <a:buFont typeface="Wingdings" panose="05000000000000000000" pitchFamily="2" charset="2"/>
+              <a:buChar char="Ø"/>
+            </a:pPr>
+            <a:r>
+              <a:rPr lang="en-SG" sz="1200" b="1" dirty="0"/>
+              <a:t>Offline encoding:</a:t>
+            </a:r>
+            <a:r>
+              <a:rPr lang="en-SG" sz="1200" dirty="0"/>
+              <a:t> dense vector embedding into Vector DB</a:t>
+            </a:r>
+          </a:p>
+          <a:p>
+            <a:pPr marL="742950" lvl="1" indent="-285750">
+              <a:buFont typeface="Wingdings" panose="05000000000000000000" pitchFamily="2" charset="2"/>
+              <a:buChar char="Ø"/>
+            </a:pPr>
+            <a:r>
+              <a:rPr lang="en-SG" sz="1200" b="1" dirty="0"/>
+              <a:t>Online</a:t>
+            </a:r>
+            <a:r>
+              <a:rPr lang="en-SG" sz="1200" dirty="0"/>
+              <a:t> </a:t>
+            </a:r>
+            <a:r>
+              <a:rPr lang="en-SG" sz="1200" b="1" dirty="0"/>
+              <a:t>retrieval: </a:t>
+            </a:r>
+            <a:r>
+              <a:rPr lang="en-SG" sz="1200" dirty="0"/>
+              <a:t>relevant document chunks based on similarity with one-shot query (cosine similarity: dense dot-product on normalized vectors; directional interpretation)</a:t>
+            </a:r>
+          </a:p>
+          <a:p>
+            <a:pPr marL="742950" lvl="1" indent="-285750">
+              <a:buFont typeface="Wingdings" panose="05000000000000000000" pitchFamily="2" charset="2"/>
+              <a:buChar char="Ø"/>
+            </a:pPr>
+            <a:endParaRPr lang="en-SG" sz="1200" dirty="0"/>
+          </a:p>
+          <a:p>
+            <a:pPr lvl="1"/>
+            <a:endParaRPr lang="en-SG" sz="1200" dirty="0"/>
+          </a:p>
+          <a:p>
+            <a:pPr marL="742950" lvl="1" indent="-285750">
+              <a:buFont typeface="Wingdings" panose="05000000000000000000" pitchFamily="2" charset="2"/>
+              <a:buChar char="Ø"/>
+            </a:pPr>
+            <a:endParaRPr lang="en-SG" sz="1200" dirty="0"/>
+          </a:p>
+          <a:p>
+            <a:pPr marL="742950" lvl="1" indent="-285750">
+              <a:buFont typeface="Wingdings" panose="05000000000000000000" pitchFamily="2" charset="2"/>
+              <a:buChar char="Ø"/>
+            </a:pPr>
+            <a:endParaRPr lang="en-SG" sz="1200" dirty="0"/>
+          </a:p>
+          <a:p>
+            <a:pPr marL="742950" lvl="1" indent="-285750">
+              <a:buFont typeface="Wingdings" panose="05000000000000000000" pitchFamily="2" charset="2"/>
+              <a:buChar char="Ø"/>
+            </a:pPr>
+            <a:endParaRPr lang="en-SG" sz="1200" dirty="0"/>
+          </a:p>
+        </p:txBody>
+      </p:sp>
+      <p:sp>
+        <p:nvSpPr>
+          <p:cNvPr id="27" name="TextBox 26">
+            <a:extLst>
+              <a:ext uri="{FF2B5EF4-FFF2-40B4-BE49-F238E27FC236}">
+                <a16:creationId xmlns:a16="http://schemas.microsoft.com/office/drawing/2014/main" id="{951840A5-A14E-0B5B-F216-9E182E2BDD60}"/>
+              </a:ext>
+            </a:extLst>
+          </p:cNvPr>
+          <p:cNvSpPr txBox="1"/>
+          <p:nvPr/>
+        </p:nvSpPr>
+        <p:spPr>
+          <a:xfrm>
+            <a:off x="3905250" y="1904867"/>
+            <a:ext cx="5435848" cy="3600986"/>
+          </a:xfrm>
+          <a:prstGeom prst="rect">
+            <a:avLst/>
+          </a:prstGeom>
+          <a:solidFill>
+            <a:schemeClr val="accent6">
+              <a:lumMod val="20000"/>
+              <a:lumOff val="80000"/>
+            </a:schemeClr>
+          </a:solidFill>
+        </p:spPr>
+        <p:txBody>
+          <a:bodyPr wrap="square">
+            <a:spAutoFit/>
+          </a:bodyPr>
+          <a:lstStyle/>
+          <a:p>
+            <a:r>
+              <a:rPr lang="en-SG" sz="1200" b="1" dirty="0"/>
+              <a:t>Sparse lexical retrieval (BM25-style; Not True BM25)</a:t>
+            </a:r>
+          </a:p>
+          <a:p>
+            <a:pPr marL="285750" indent="-285750">
+              <a:buFont typeface="Wingdings" panose="05000000000000000000" pitchFamily="2" charset="2"/>
+              <a:buChar char="Ø"/>
+            </a:pPr>
+            <a:r>
+              <a:rPr lang="en-SG" sz="1200" b="1" dirty="0"/>
+              <a:t>Purpose: </a:t>
+            </a:r>
+            <a:r>
+              <a:rPr lang="en-SG" sz="1200" dirty="0"/>
+              <a:t>Keyword grounding in encoding and retrieval</a:t>
+            </a:r>
+          </a:p>
+          <a:p>
+            <a:endParaRPr lang="en-SG" sz="1200" dirty="0"/>
+          </a:p>
+          <a:p>
+            <a:pPr marL="285750" indent="-285750">
+              <a:buFont typeface="Wingdings" panose="05000000000000000000" pitchFamily="2" charset="2"/>
+              <a:buChar char="Ø"/>
+            </a:pPr>
+            <a:r>
+              <a:rPr lang="en-SG" sz="1200" b="1" dirty="0"/>
+              <a:t>Key design choice and why:</a:t>
+            </a:r>
+          </a:p>
+          <a:p>
+            <a:pPr marL="742950" lvl="1" indent="-285750">
+              <a:buFont typeface="Wingdings" panose="05000000000000000000" pitchFamily="2" charset="2"/>
+              <a:buChar char="Ø"/>
+            </a:pPr>
+            <a:r>
+              <a:rPr lang="en-SG" sz="1200" b="1" dirty="0"/>
+              <a:t>Offline document encoding (why BM25-style):  </a:t>
+            </a:r>
+            <a:r>
+              <a:rPr lang="en-SG" sz="1200" dirty="0"/>
+              <a:t>Addresses repeated terms (TF saturation) and uneven chunk sizes (document length normalization)</a:t>
+            </a:r>
+          </a:p>
+          <a:p>
+            <a:pPr marL="742950" lvl="1" indent="-285750">
+              <a:buFont typeface="Wingdings" panose="05000000000000000000" pitchFamily="2" charset="2"/>
+              <a:buChar char="Ø"/>
+            </a:pPr>
+            <a:r>
+              <a:rPr lang="en-SG" sz="1200" b="1" dirty="0"/>
+              <a:t>Online query encoding (TF-IDF):  </a:t>
+            </a:r>
+            <a:r>
+              <a:rPr lang="en-SG" sz="1200" dirty="0"/>
+              <a:t>Preserve intent signals from query (no extra weights unlike document encoding)</a:t>
+            </a:r>
+          </a:p>
+          <a:p>
+            <a:pPr marL="742950" lvl="1" indent="-285750">
+              <a:buFont typeface="Wingdings" panose="05000000000000000000" pitchFamily="2" charset="2"/>
+              <a:buChar char="Ø"/>
+            </a:pPr>
+            <a:r>
+              <a:rPr lang="en-SG" sz="1200" b="1" dirty="0"/>
+              <a:t>Online retrieval: </a:t>
+            </a:r>
+            <a:r>
+              <a:rPr lang="en-SG" sz="1200" dirty="0"/>
+              <a:t>relevant document chunks based on similarity with one-shot query (sparse dot-product; vectors not normalized; weighted-overlap magnitude interpretation)</a:t>
+            </a:r>
+          </a:p>
+          <a:p>
+            <a:pPr marL="742950" lvl="1" indent="-285750">
+              <a:buFont typeface="Wingdings" panose="05000000000000000000" pitchFamily="2" charset="2"/>
+              <a:buChar char="Ø"/>
+            </a:pPr>
+            <a:r>
+              <a:rPr lang="en-SG" sz="1200" b="1" dirty="0"/>
+              <a:t>Why not True BM25: </a:t>
+            </a:r>
+            <a:r>
+              <a:rPr lang="en-SG" sz="1200" dirty="0"/>
+              <a:t>In textbook BM25, document and query weights are computed for full score refresh at query time. In this implementation, we pre-compute document weights and load into vector DB to approximate BM25-style for a practical implementation.</a:t>
+            </a:r>
+          </a:p>
+          <a:p>
+            <a:pPr marL="742950" lvl="1" indent="-285750">
+              <a:buFont typeface="Wingdings" panose="05000000000000000000" pitchFamily="2" charset="2"/>
+              <a:buChar char="Ø"/>
+            </a:pPr>
+            <a:endParaRPr lang="en-SG" sz="1200" dirty="0"/>
+          </a:p>
+          <a:p>
+            <a:pPr marL="285750" indent="-285750">
+              <a:buFont typeface="Wingdings" panose="05000000000000000000" pitchFamily="2" charset="2"/>
+              <a:buChar char="Ø"/>
+            </a:pPr>
+            <a:r>
+              <a:rPr lang="en-SG" sz="1200" dirty="0"/>
+              <a:t>Refer </a:t>
+            </a:r>
+            <a:r>
+              <a:rPr lang="en-SG" sz="1200" i="1" dirty="0">
+                <a:solidFill>
+                  <a:srgbClr val="0070C0"/>
+                </a:solidFill>
+              </a:rPr>
+              <a:t>docs/vector_db/math.md</a:t>
+            </a:r>
+            <a:r>
+              <a:rPr lang="en-SG" sz="1200" i="1" dirty="0"/>
+              <a:t> </a:t>
+            </a:r>
+            <a:r>
+              <a:rPr lang="en-SG" sz="1200" dirty="0"/>
+              <a:t>for key formulas and details</a:t>
+            </a:r>
+          </a:p>
+          <a:p>
+            <a:r>
+              <a:rPr lang="en-SG" sz="1200" i="1" dirty="0">
+                <a:hlinkClick r:id="rId3"/>
+              </a:rPr>
+              <a:t>Reference:  What is BM25 (Best Matching 25) Algorithm – </a:t>
+            </a:r>
+            <a:r>
+              <a:rPr lang="en-SG" sz="1200" i="1" dirty="0" err="1">
+                <a:hlinkClick r:id="rId3"/>
+              </a:rPr>
+              <a:t>GeeksforGeeks</a:t>
+            </a:r>
+            <a:endParaRPr lang="en-SG" sz="1200" dirty="0"/>
+          </a:p>
+        </p:txBody>
+      </p:sp>
+      <p:sp>
+        <p:nvSpPr>
+          <p:cNvPr id="6" name="TextBox 5">
+            <a:extLst>
+              <a:ext uri="{FF2B5EF4-FFF2-40B4-BE49-F238E27FC236}">
+                <a16:creationId xmlns:a16="http://schemas.microsoft.com/office/drawing/2014/main" id="{2B7C61AE-A819-EBAD-8964-3217C70AD38C}"/>
+              </a:ext>
+            </a:extLst>
+          </p:cNvPr>
+          <p:cNvSpPr txBox="1"/>
+          <p:nvPr/>
+        </p:nvSpPr>
+        <p:spPr>
+          <a:xfrm>
+            <a:off x="9341098" y="1904867"/>
+            <a:ext cx="2622301" cy="3600986"/>
+          </a:xfrm>
+          <a:prstGeom prst="rect">
+            <a:avLst/>
+          </a:prstGeom>
+          <a:solidFill>
+            <a:schemeClr val="accent6">
+              <a:lumMod val="40000"/>
+              <a:lumOff val="60000"/>
+            </a:schemeClr>
+          </a:solidFill>
+        </p:spPr>
+        <p:txBody>
+          <a:bodyPr wrap="square">
+            <a:spAutoFit/>
+          </a:bodyPr>
+          <a:lstStyle/>
+          <a:p>
+            <a:r>
+              <a:rPr lang="en-SG" sz="1200" b="1" dirty="0"/>
+              <a:t>RAG Scoring Algorithm (downstream)</a:t>
+            </a:r>
+          </a:p>
+          <a:p>
+            <a:pPr marL="285750" indent="-285750">
+              <a:buFont typeface="Wingdings" panose="05000000000000000000" pitchFamily="2" charset="2"/>
+              <a:buChar char="Ø"/>
+            </a:pPr>
+            <a:r>
+              <a:rPr lang="en-SG" sz="1200" dirty="0"/>
+              <a:t>Further downstream scoring using the 2 components (dense + sparse) is further  described in separate slide</a:t>
+            </a:r>
+          </a:p>
+          <a:p>
+            <a:pPr marL="285750" indent="-285750">
+              <a:buFont typeface="Wingdings" panose="05000000000000000000" pitchFamily="2" charset="2"/>
+              <a:buChar char="Ø"/>
+            </a:pPr>
+            <a:endParaRPr lang="en-SG" sz="1200" dirty="0"/>
+          </a:p>
+          <a:p>
+            <a:pPr marL="285750" indent="-285750">
+              <a:buFont typeface="Wingdings" panose="05000000000000000000" pitchFamily="2" charset="2"/>
+              <a:buChar char="Ø"/>
+            </a:pPr>
+            <a:endParaRPr lang="en-SG" sz="1200" dirty="0"/>
+          </a:p>
+          <a:p>
+            <a:pPr marL="285750" indent="-285750">
+              <a:buFont typeface="Wingdings" panose="05000000000000000000" pitchFamily="2" charset="2"/>
+              <a:buChar char="Ø"/>
+            </a:pPr>
+            <a:endParaRPr lang="en-SG" sz="1200" dirty="0"/>
+          </a:p>
+          <a:p>
+            <a:pPr marL="285750" indent="-285750">
+              <a:buFont typeface="Wingdings" panose="05000000000000000000" pitchFamily="2" charset="2"/>
+              <a:buChar char="Ø"/>
+            </a:pPr>
+            <a:endParaRPr lang="en-SG" sz="1200" dirty="0"/>
+          </a:p>
+          <a:p>
+            <a:pPr marL="285750" indent="-285750">
+              <a:buFont typeface="Wingdings" panose="05000000000000000000" pitchFamily="2" charset="2"/>
+              <a:buChar char="Ø"/>
+            </a:pPr>
+            <a:endParaRPr lang="en-SG" sz="1200" dirty="0"/>
+          </a:p>
+          <a:p>
+            <a:pPr marL="285750" indent="-285750">
+              <a:buFont typeface="Wingdings" panose="05000000000000000000" pitchFamily="2" charset="2"/>
+              <a:buChar char="Ø"/>
+            </a:pPr>
+            <a:endParaRPr lang="en-SG" sz="1200" dirty="0"/>
+          </a:p>
+          <a:p>
+            <a:pPr marL="285750" indent="-285750">
+              <a:buFont typeface="Wingdings" panose="05000000000000000000" pitchFamily="2" charset="2"/>
+              <a:buChar char="Ø"/>
+            </a:pPr>
+            <a:endParaRPr lang="en-SG" sz="1200" dirty="0"/>
+          </a:p>
+          <a:p>
+            <a:pPr marL="285750" indent="-285750">
+              <a:buFont typeface="Wingdings" panose="05000000000000000000" pitchFamily="2" charset="2"/>
+              <a:buChar char="Ø"/>
+            </a:pPr>
+            <a:endParaRPr lang="en-SG" sz="1200" dirty="0"/>
+          </a:p>
+          <a:p>
+            <a:pPr marL="285750" indent="-285750">
+              <a:buFont typeface="Wingdings" panose="05000000000000000000" pitchFamily="2" charset="2"/>
+              <a:buChar char="Ø"/>
+            </a:pPr>
+            <a:endParaRPr lang="en-SG" sz="1200" dirty="0"/>
+          </a:p>
+          <a:p>
+            <a:pPr marL="285750" indent="-285750">
+              <a:buFont typeface="Wingdings" panose="05000000000000000000" pitchFamily="2" charset="2"/>
+              <a:buChar char="Ø"/>
+            </a:pPr>
+            <a:endParaRPr lang="en-SG" sz="1200" dirty="0"/>
+          </a:p>
+          <a:p>
+            <a:endParaRPr lang="en-SG" sz="1200" dirty="0"/>
+          </a:p>
+          <a:p>
+            <a:pPr marL="285750" indent="-285750">
+              <a:buFont typeface="Wingdings" panose="05000000000000000000" pitchFamily="2" charset="2"/>
+              <a:buChar char="Ø"/>
+            </a:pPr>
+            <a:endParaRPr lang="en-SG" sz="1200" dirty="0"/>
+          </a:p>
+          <a:p>
+            <a:pPr marL="285750" indent="-285750">
+              <a:buFont typeface="Wingdings" panose="05000000000000000000" pitchFamily="2" charset="2"/>
+              <a:buChar char="Ø"/>
+            </a:pPr>
+            <a:endParaRPr lang="en-SG" sz="1200" dirty="0"/>
+          </a:p>
+        </p:txBody>
+      </p:sp>
+    </p:spTree>
+    <p:extLst>
+      <p:ext uri="{BB962C8B-B14F-4D97-AF65-F5344CB8AC3E}">
+        <p14:creationId xmlns:p14="http://schemas.microsoft.com/office/powerpoint/2010/main" val="674919487"/>
+      </p:ext>
+    </p:extLst>
+  </p:cSld>
+  <p:clrMapOvr>
+    <a:masterClrMapping/>
+  </p:clrMapOvr>
+</p:sld>
+</file>
+
+<file path=ppt/slides/slide5.xml><?xml version="1.0" encoding="utf-8"?>
+<p:sld xmlns:a="http://schemas.openxmlformats.org/drawingml/2006/main" xmlns:r="http://schemas.openxmlformats.org/officeDocument/2006/relationships" xmlns:p="http://schemas.openxmlformats.org/presentationml/2006/main">
+  <p:cSld>
+    <p:spTree>
+      <p:nvGrpSpPr>
+        <p:cNvPr id="1" name="">
+          <a:extLst>
+            <a:ext uri="{FF2B5EF4-FFF2-40B4-BE49-F238E27FC236}">
               <a16:creationId xmlns:a16="http://schemas.microsoft.com/office/drawing/2014/main" id="{971C759E-F857-2A8A-F8A4-B3A7D0134121}"/>
             </a:ext>
           </a:extLst>
@@ -12210,118 +12919,6 @@
       </p:sp>
       <p:sp>
         <p:nvSpPr>
-          <p:cNvPr id="9" name="Rectangle 8">
-            <a:extLst>
-              <a:ext uri="{FF2B5EF4-FFF2-40B4-BE49-F238E27FC236}">
-                <a16:creationId xmlns:a16="http://schemas.microsoft.com/office/drawing/2014/main" id="{57223B41-FF33-C214-F5A9-DA4E7CF9BF28}"/>
-              </a:ext>
-            </a:extLst>
-          </p:cNvPr>
-          <p:cNvSpPr/>
-          <p:nvPr/>
-        </p:nvSpPr>
-        <p:spPr>
-          <a:xfrm>
-            <a:off x="10938933" y="0"/>
-            <a:ext cx="1253067" cy="1049235"/>
-          </a:xfrm>
-          <a:prstGeom prst="rect">
-            <a:avLst/>
-          </a:prstGeom>
-          <a:solidFill>
-            <a:srgbClr val="FFFF00"/>
-          </a:solidFill>
-        </p:spPr>
-        <p:style>
-          <a:lnRef idx="2">
-            <a:schemeClr val="accent1">
-              <a:shade val="15000"/>
-            </a:schemeClr>
-          </a:lnRef>
-          <a:fillRef idx="1">
-            <a:schemeClr val="accent1"/>
-          </a:fillRef>
-          <a:effectRef idx="0">
-            <a:schemeClr val="accent1"/>
-          </a:effectRef>
-          <a:fontRef idx="minor">
-            <a:schemeClr val="lt1"/>
-          </a:fontRef>
-        </p:style>
-        <p:txBody>
-          <a:bodyPr rtlCol="0" anchor="ctr"/>
-          <a:lstStyle/>
-          <a:p>
-            <a:pPr algn="ctr"/>
-            <a:r>
-              <a:rPr lang="en-SG" sz="1400" dirty="0">
-                <a:solidFill>
-                  <a:srgbClr val="FF0000"/>
-                </a:solidFill>
-              </a:rPr>
-              <a:t>To update scoring tier-based recency boost</a:t>
-            </a:r>
-          </a:p>
-        </p:txBody>
-      </p:sp>
-      <p:sp>
-        <p:nvSpPr>
-          <p:cNvPr id="11" name="Rectangle 10">
-            <a:extLst>
-              <a:ext uri="{FF2B5EF4-FFF2-40B4-BE49-F238E27FC236}">
-                <a16:creationId xmlns:a16="http://schemas.microsoft.com/office/drawing/2014/main" id="{238C9308-CA7F-C1F7-4199-A64285DFD968}"/>
-              </a:ext>
-            </a:extLst>
-          </p:cNvPr>
-          <p:cNvSpPr/>
-          <p:nvPr/>
-        </p:nvSpPr>
-        <p:spPr>
-          <a:xfrm>
-            <a:off x="8920632" y="145983"/>
-            <a:ext cx="1762309" cy="1049235"/>
-          </a:xfrm>
-          <a:prstGeom prst="rect">
-            <a:avLst/>
-          </a:prstGeom>
-          <a:solidFill>
-            <a:srgbClr val="FFFF00"/>
-          </a:solidFill>
-        </p:spPr>
-        <p:style>
-          <a:lnRef idx="2">
-            <a:schemeClr val="accent1">
-              <a:shade val="15000"/>
-            </a:schemeClr>
-          </a:lnRef>
-          <a:fillRef idx="1">
-            <a:schemeClr val="accent1"/>
-          </a:fillRef>
-          <a:effectRef idx="0">
-            <a:schemeClr val="accent1"/>
-          </a:effectRef>
-          <a:fontRef idx="minor">
-            <a:schemeClr val="lt1"/>
-          </a:fontRef>
-        </p:style>
-        <p:txBody>
-          <a:bodyPr rtlCol="0" anchor="ctr"/>
-          <a:lstStyle/>
-          <a:p>
-            <a:pPr algn="ctr"/>
-            <a:r>
-              <a:rPr lang="en-SG" sz="1400" dirty="0">
-                <a:solidFill>
-                  <a:srgbClr val="FF0000"/>
-                </a:solidFill>
-              </a:rPr>
-              <a:t>Consider add 1 slide on scoring algorithm based on scoring.md</a:t>
-            </a:r>
-          </a:p>
-        </p:txBody>
-      </p:sp>
-      <p:sp>
-        <p:nvSpPr>
           <p:cNvPr id="14" name="TextBox 13">
             <a:extLst>
               <a:ext uri="{FF2B5EF4-FFF2-40B4-BE49-F238E27FC236}">
@@ -12334,8 +12931,8 @@
         </p:nvSpPr>
         <p:spPr>
           <a:xfrm>
-            <a:off x="1451579" y="2045391"/>
-            <a:ext cx="3551108" cy="2308324"/>
+            <a:off x="150581" y="1841889"/>
+            <a:ext cx="3503553" cy="1569660"/>
           </a:xfrm>
           <a:prstGeom prst="rect">
             <a:avLst/>
@@ -12349,8 +12946,8 @@
           <a:lstStyle/>
           <a:p>
             <a:r>
-              <a:rPr lang="en-SG" dirty="0"/>
-              <a:t>Retrieval</a:t>
+              <a:rPr lang="en-SG" sz="1600" b="1" dirty="0"/>
+              <a:t>Retrieval from separate ranked list</a:t>
             </a:r>
           </a:p>
           <a:p>
@@ -12359,26 +12956,20 @@
               <a:buChar char="Ø"/>
             </a:pPr>
             <a:r>
-              <a:rPr lang="en-SG" dirty="0"/>
-              <a:t>Get </a:t>
-            </a:r>
-            <a:r>
-              <a:rPr lang="en-SG" dirty="0" err="1"/>
+              <a:rPr lang="en-SG" sz="1600" dirty="0"/>
+              <a:t>Keep </a:t>
+            </a:r>
+            <a:r>
+              <a:rPr lang="en-SG" sz="1600" i="1" dirty="0"/>
               <a:t>top_k</a:t>
             </a:r>
             <a:r>
-              <a:rPr lang="en-SG" dirty="0"/>
-              <a:t> from each list before merging</a:t>
-            </a:r>
-          </a:p>
-          <a:p>
-            <a:pPr marL="285750" indent="-285750">
-              <a:buFont typeface="Wingdings" panose="05000000000000000000" pitchFamily="2" charset="2"/>
-              <a:buChar char="Ø"/>
-            </a:pPr>
-            <a:r>
-              <a:rPr lang="en-SG" dirty="0"/>
-              <a:t>Reciprocal Rank Fusion (RRF) + Tiered recency boost</a:t>
+              <a:rPr lang="en-SG" sz="1600" dirty="0"/>
+              <a:t> from each ranked list </a:t>
+            </a:r>
+            <a:r>
+              <a:rPr lang="en-SG" sz="1600" i="1" dirty="0"/>
+              <a:t>(Total = 2*top_k)</a:t>
             </a:r>
           </a:p>
           <a:p>
@@ -12387,28 +12978,18 @@
               <a:buChar char="Ø"/>
             </a:pPr>
             <a:r>
-              <a:rPr lang="en-SG" dirty="0"/>
-              <a:t>Two ranked lists</a:t>
-            </a:r>
-          </a:p>
-          <a:p>
-            <a:pPr marL="1200150" lvl="2" indent="-285750">
+              <a:rPr lang="en-SG" sz="1600" dirty="0"/>
+              <a:t>Dense search (semantic)</a:t>
+            </a:r>
+          </a:p>
+          <a:p>
+            <a:pPr marL="742950" lvl="1" indent="-285750">
               <a:buFont typeface="Wingdings" panose="05000000000000000000" pitchFamily="2" charset="2"/>
               <a:buChar char="Ø"/>
             </a:pPr>
             <a:r>
-              <a:rPr lang="en-SG" dirty="0"/>
-              <a:t>dense_vector search</a:t>
-            </a:r>
-          </a:p>
-          <a:p>
-            <a:pPr marL="1200150" lvl="2" indent="-285750">
-              <a:buFont typeface="Wingdings" panose="05000000000000000000" pitchFamily="2" charset="2"/>
-              <a:buChar char="Ø"/>
-            </a:pPr>
-            <a:r>
-              <a:rPr lang="en-SG" dirty="0"/>
-              <a:t>Sparse/BM25 search</a:t>
+              <a:rPr lang="en-SG" sz="1600" dirty="0"/>
+              <a:t>Sparse search (BM25-style, lexical)</a:t>
             </a:r>
           </a:p>
         </p:txBody>
@@ -12427,8 +13008,8 @@
         </p:nvSpPr>
         <p:spPr>
           <a:xfrm>
-            <a:off x="6454901" y="2045391"/>
-            <a:ext cx="4484032" cy="923330"/>
+            <a:off x="7896224" y="1853754"/>
+            <a:ext cx="4058601" cy="1846659"/>
           </a:xfrm>
           <a:prstGeom prst="rect">
             <a:avLst/>
@@ -12442,8 +13023,8 @@
           <a:lstStyle/>
           <a:p>
             <a:r>
-              <a:rPr lang="en-SG" dirty="0"/>
-              <a:t>Re-ranking</a:t>
+              <a:rPr lang="en-SG" sz="1600" b="1" dirty="0"/>
+              <a:t>Re-ranking after merged</a:t>
             </a:r>
           </a:p>
           <a:p>
@@ -12452,8 +13033,43 @@
               <a:buChar char="Ø"/>
             </a:pPr>
             <a:r>
-              <a:rPr lang="en-SG" dirty="0"/>
-              <a:t>Re-rank merged list with cross-encoder transformer + tiered recency boost</a:t>
+              <a:rPr lang="en-SG" sz="1600" dirty="0"/>
+              <a:t>Re-rank merged list with cross-encoder transformer</a:t>
+            </a:r>
+          </a:p>
+          <a:p>
+            <a:pPr marL="285750" indent="-285750">
+              <a:buFont typeface="Wingdings" panose="05000000000000000000" pitchFamily="2" charset="2"/>
+              <a:buChar char="Ø"/>
+            </a:pPr>
+            <a:r>
+              <a:rPr lang="en-SG" sz="1600" dirty="0"/>
+              <a:t>Normalize score</a:t>
+            </a:r>
+            <a:endParaRPr lang="en-SG" sz="1600" i="1" dirty="0"/>
+          </a:p>
+          <a:p>
+            <a:pPr marL="285750" indent="-285750">
+              <a:buFont typeface="Wingdings" panose="05000000000000000000" pitchFamily="2" charset="2"/>
+              <a:buChar char="Ø"/>
+            </a:pPr>
+            <a:r>
+              <a:rPr lang="en-SG" sz="1600" dirty="0"/>
+              <a:t>Tiered recency boost (multiplicative), consistent on normalized score</a:t>
+            </a:r>
+          </a:p>
+          <a:p>
+            <a:pPr marL="285750" indent="-285750">
+              <a:buFont typeface="Wingdings" panose="05000000000000000000" pitchFamily="2" charset="2"/>
+              <a:buChar char="Ø"/>
+            </a:pPr>
+            <a:r>
+              <a:rPr lang="en-SG" sz="1600" dirty="0"/>
+              <a:t>Keep </a:t>
+            </a:r>
+            <a:r>
+              <a:rPr lang="en-SG" sz="1600" i="1" dirty="0"/>
+              <a:t>rerank_candidate_limit</a:t>
             </a:r>
           </a:p>
         </p:txBody>
@@ -12472,13 +13088,18 @@
         </p:nvSpPr>
         <p:spPr>
           <a:xfrm>
-            <a:off x="638175" y="4649939"/>
-            <a:ext cx="4924425" cy="738664"/>
+            <a:off x="3616518" y="3626338"/>
+            <a:ext cx="3832032" cy="769441"/>
           </a:xfrm>
           <a:prstGeom prst="rect">
             <a:avLst/>
           </a:prstGeom>
-          <a:noFill/>
+          <a:solidFill>
+            <a:schemeClr val="accent6">
+              <a:lumMod val="20000"/>
+              <a:lumOff val="80000"/>
+            </a:schemeClr>
+          </a:solidFill>
         </p:spPr>
         <p:txBody>
           <a:bodyPr wrap="square">
@@ -12487,54 +13108,37 @@
           <a:lstStyle/>
           <a:p>
             <a:r>
-              <a:rPr lang="en-SG" sz="1400" i="1" dirty="0"/>
+              <a:rPr lang="en-SG" sz="1100" b="1" i="1" dirty="0"/>
+              <a:t>Key Formulas:</a:t>
+            </a:r>
+            <a:endParaRPr lang="en-SG" sz="1100" i="1" dirty="0"/>
+          </a:p>
+          <a:p>
+            <a:r>
+              <a:rPr lang="en-SG" sz="1100" i="1" dirty="0"/>
               <a:t>score_rrf = sum(1 / (k + rank))</a:t>
             </a:r>
           </a:p>
           <a:p>
-            <a:r>
-              <a:rPr lang="en-SG" sz="1400" i="1" dirty="0" err="1"/>
+            <a:endParaRPr lang="en-SG" sz="1100" i="1" dirty="0"/>
+          </a:p>
+          <a:p>
+            <a:r>
+              <a:rPr lang="en-SG" sz="1100" i="1" dirty="0"/>
+              <a:t>score_rrf = score_rrf * (1 + retrieve_recency_boost * </a:t>
+            </a:r>
+            <a:r>
+              <a:rPr lang="en-SG" sz="1100" b="1" i="1" dirty="0">
+                <a:solidFill>
+                  <a:srgbClr val="0070C0"/>
+                </a:solidFill>
+              </a:rPr>
               <a:t>boost_tier</a:t>
             </a:r>
             <a:r>
-              <a:rPr lang="en-SG" sz="1400" i="1" dirty="0"/>
-              <a:t> = (window - (</a:t>
-            </a:r>
-            <a:r>
-              <a:rPr lang="en-SG" sz="1400" i="1" dirty="0" err="1"/>
-              <a:t>current_year</a:t>
-            </a:r>
-            <a:r>
-              <a:rPr lang="en-SG" sz="1400" i="1" dirty="0"/>
-              <a:t> - </a:t>
-            </a:r>
-            <a:r>
-              <a:rPr lang="en-SG" sz="1400" i="1" dirty="0" err="1"/>
-              <a:t>fy</a:t>
-            </a:r>
-            <a:r>
-              <a:rPr lang="en-SG" sz="1400" i="1" dirty="0"/>
-              <a:t>)) / window</a:t>
-            </a:r>
-          </a:p>
-          <a:p>
-            <a:r>
-              <a:rPr lang="en-SG" sz="1400" i="1" dirty="0"/>
-              <a:t>score_rrf = score_rrf + </a:t>
-            </a:r>
-            <a:r>
-              <a:rPr lang="en-SG" sz="1400" i="1" dirty="0" err="1"/>
-              <a:t>retrieve_recency_boost</a:t>
-            </a:r>
-            <a:r>
-              <a:rPr lang="en-SG" sz="1400" i="1" dirty="0"/>
-              <a:t> * </a:t>
-            </a:r>
-            <a:r>
-              <a:rPr lang="en-SG" sz="1400" i="1" dirty="0" err="1"/>
-              <a:t>boost_tier</a:t>
-            </a:r>
-            <a:endParaRPr lang="en-SG" sz="1400" i="1" dirty="0"/>
+              <a:rPr lang="en-SG" sz="1100" i="1" dirty="0"/>
+              <a:t>)</a:t>
+            </a:r>
           </a:p>
         </p:txBody>
       </p:sp>
@@ -12552,8 +13156,225 @@
         </p:nvSpPr>
         <p:spPr>
           <a:xfrm>
-            <a:off x="6096000" y="4491037"/>
-            <a:ext cx="5986992" cy="738664"/>
+            <a:off x="7766326" y="3615638"/>
+            <a:ext cx="4311373" cy="1277273"/>
+          </a:xfrm>
+          <a:prstGeom prst="rect">
+            <a:avLst/>
+          </a:prstGeom>
+          <a:solidFill>
+            <a:schemeClr val="accent6">
+              <a:lumMod val="20000"/>
+              <a:lumOff val="80000"/>
+            </a:schemeClr>
+          </a:solidFill>
+        </p:spPr>
+        <p:txBody>
+          <a:bodyPr wrap="square">
+            <a:spAutoFit/>
+          </a:bodyPr>
+          <a:lstStyle/>
+          <a:p>
+            <a:r>
+              <a:rPr lang="en-SG" sz="1100" b="1" i="1" dirty="0"/>
+              <a:t>Key Formulas:</a:t>
+            </a:r>
+            <a:endParaRPr lang="en-SG" sz="1100" i="1" dirty="0"/>
+          </a:p>
+          <a:p>
+            <a:r>
+              <a:rPr lang="en-SG" sz="1100" i="1" dirty="0"/>
+              <a:t>score_ce = cross_encoder.predict(query, hit.text)</a:t>
+            </a:r>
+          </a:p>
+          <a:p>
+            <a:endParaRPr lang="en-SG" sz="1100" i="1" dirty="0"/>
+          </a:p>
+          <a:p>
+            <a:r>
+              <a:rPr lang="en-SG" sz="1100" i="1" dirty="0"/>
+              <a:t>score_norm = (score_ce - min) / (max - min)</a:t>
+            </a:r>
+          </a:p>
+          <a:p>
+            <a:endParaRPr lang="en-SG" sz="1100" i="1" dirty="0"/>
+          </a:p>
+          <a:p>
+            <a:r>
+              <a:rPr lang="en-SG" sz="1100" i="1" dirty="0"/>
+              <a:t>score_final = score_norm * (1 + rerank_recency_boost * </a:t>
+            </a:r>
+            <a:r>
+              <a:rPr lang="en-SG" sz="1100" b="1" i="1" dirty="0">
+                <a:solidFill>
+                  <a:srgbClr val="0070C0"/>
+                </a:solidFill>
+              </a:rPr>
+              <a:t>boost_tier</a:t>
+            </a:r>
+            <a:r>
+              <a:rPr lang="en-SG" sz="1100" i="1" dirty="0"/>
+              <a:t>)     (if hit is in recent window)</a:t>
+            </a:r>
+          </a:p>
+        </p:txBody>
+      </p:sp>
+      <p:sp>
+        <p:nvSpPr>
+          <p:cNvPr id="34" name="TextBox 33">
+            <a:extLst>
+              <a:ext uri="{FF2B5EF4-FFF2-40B4-BE49-F238E27FC236}">
+                <a16:creationId xmlns:a16="http://schemas.microsoft.com/office/drawing/2014/main" id="{3F0FCB23-BA9B-E25C-CB7D-724B342406BA}"/>
+              </a:ext>
+            </a:extLst>
+          </p:cNvPr>
+          <p:cNvSpPr txBox="1"/>
+          <p:nvPr/>
+        </p:nvSpPr>
+        <p:spPr>
+          <a:xfrm>
+            <a:off x="3616516" y="4395779"/>
+            <a:ext cx="3852703" cy="1277273"/>
+          </a:xfrm>
+          <a:prstGeom prst="rect">
+            <a:avLst/>
+          </a:prstGeom>
+          <a:solidFill>
+            <a:schemeClr val="accent6">
+              <a:lumMod val="40000"/>
+              <a:lumOff val="60000"/>
+            </a:schemeClr>
+          </a:solidFill>
+        </p:spPr>
+        <p:txBody>
+          <a:bodyPr wrap="square">
+            <a:spAutoFit/>
+          </a:bodyPr>
+          <a:lstStyle/>
+          <a:p>
+            <a:r>
+              <a:rPr lang="en-SG" sz="1400" b="1" i="1" dirty="0"/>
+              <a:t>Illustrative Example – RRF (w recency boost) </a:t>
+            </a:r>
+          </a:p>
+          <a:p>
+            <a:r>
+              <a:rPr lang="en-SG" sz="1050" i="1" dirty="0"/>
+              <a:t>Dense rank = 3 → 1/(60+3) = 0.0159</a:t>
+            </a:r>
+          </a:p>
+          <a:p>
+            <a:r>
+              <a:rPr lang="en-SG" sz="1050" i="1" dirty="0"/>
+              <a:t>Sparse rank = 9 → 1/(60+9) = 0.0145</a:t>
+            </a:r>
+          </a:p>
+          <a:p>
+            <a:r>
+              <a:rPr lang="en-SG" sz="1050" i="1" dirty="0"/>
+              <a:t>Merged RRF score = 0.0159 + 0.0145 = 0.0304</a:t>
+            </a:r>
+          </a:p>
+          <a:p>
+            <a:endParaRPr lang="en-SG" sz="1050" i="1" dirty="0"/>
+          </a:p>
+          <a:p>
+            <a:r>
+              <a:rPr lang="en-SG" sz="1050" i="1" dirty="0"/>
+              <a:t>If FY2025 with boost_tier=1.0 and retrieve_recency_boost=0.80: </a:t>
+            </a:r>
+          </a:p>
+          <a:p>
+            <a:r>
+              <a:rPr lang="en-SG" sz="1050" b="1" i="1" dirty="0"/>
+              <a:t>score_rrf = 0.0304 * (1 + 0.80) = 0.0547</a:t>
+            </a:r>
+          </a:p>
+        </p:txBody>
+      </p:sp>
+      <p:sp>
+        <p:nvSpPr>
+          <p:cNvPr id="38" name="TextBox 37">
+            <a:extLst>
+              <a:ext uri="{FF2B5EF4-FFF2-40B4-BE49-F238E27FC236}">
+                <a16:creationId xmlns:a16="http://schemas.microsoft.com/office/drawing/2014/main" id="{20F3FFC3-0E20-CFEA-D386-7DDED5FA112D}"/>
+              </a:ext>
+            </a:extLst>
+          </p:cNvPr>
+          <p:cNvSpPr txBox="1"/>
+          <p:nvPr/>
+        </p:nvSpPr>
+        <p:spPr>
+          <a:xfrm>
+            <a:off x="7766326" y="4892911"/>
+            <a:ext cx="4311373" cy="1115690"/>
+          </a:xfrm>
+          <a:prstGeom prst="rect">
+            <a:avLst/>
+          </a:prstGeom>
+          <a:solidFill>
+            <a:schemeClr val="accent6">
+              <a:lumMod val="40000"/>
+              <a:lumOff val="60000"/>
+            </a:schemeClr>
+          </a:solidFill>
+        </p:spPr>
+        <p:txBody>
+          <a:bodyPr wrap="square">
+            <a:spAutoFit/>
+          </a:bodyPr>
+          <a:lstStyle/>
+          <a:p>
+            <a:r>
+              <a:rPr lang="en-SG" sz="1400" b="1" i="1" dirty="0"/>
+              <a:t>Illustrative Example – Re-ranking (w recency boost)</a:t>
+            </a:r>
+          </a:p>
+          <a:p>
+            <a:r>
+              <a:rPr lang="en-SG" sz="1050" i="1" dirty="0"/>
+              <a:t>Raw cross-encoder scores for a query: min= -2.0, max= 3.0</a:t>
+            </a:r>
+          </a:p>
+          <a:p>
+            <a:r>
+              <a:rPr lang="en-SG" sz="1050" i="1" dirty="0"/>
+              <a:t>A hit with score=1.0 → score_norm = (1 - (-2)) / (3 - (-2)) = 0.6</a:t>
+            </a:r>
+          </a:p>
+          <a:p>
+            <a:endParaRPr lang="en-SG" sz="1050" i="1" dirty="0"/>
+          </a:p>
+          <a:p>
+            <a:r>
+              <a:rPr lang="en-SG" sz="1050" i="1" dirty="0"/>
+              <a:t>If FY2025 and boost_tier=1.0 with boost=0.80: </a:t>
+            </a:r>
+          </a:p>
+          <a:p>
+            <a:r>
+              <a:rPr lang="en-SG" sz="1050" b="1" i="1" dirty="0"/>
+              <a:t>score_final = 0.6 * (1 + 0.80) = 1.08</a:t>
+            </a:r>
+          </a:p>
+        </p:txBody>
+      </p:sp>
+      <p:sp>
+        <p:nvSpPr>
+          <p:cNvPr id="39" name="TextBox 38">
+            <a:extLst>
+              <a:ext uri="{FF2B5EF4-FFF2-40B4-BE49-F238E27FC236}">
+                <a16:creationId xmlns:a16="http://schemas.microsoft.com/office/drawing/2014/main" id="{8A528881-0ADD-DDB8-B326-DAA96FFFC21D}"/>
+              </a:ext>
+            </a:extLst>
+          </p:cNvPr>
+          <p:cNvSpPr txBox="1"/>
+          <p:nvPr/>
+        </p:nvSpPr>
+        <p:spPr>
+          <a:xfrm>
+            <a:off x="3792815" y="1853754"/>
+            <a:ext cx="3390900" cy="1815882"/>
           </a:xfrm>
           <a:prstGeom prst="rect">
             <a:avLst/>
@@ -12567,72 +13388,185 @@
           <a:lstStyle/>
           <a:p>
             <a:r>
-              <a:rPr lang="en-SG" sz="1400" i="1" dirty="0" err="1"/>
-              <a:t>score_ce</a:t>
-            </a:r>
-            <a:r>
-              <a:rPr lang="en-SG" sz="1400" i="1" dirty="0"/>
-              <a:t> = </a:t>
-            </a:r>
-            <a:r>
-              <a:rPr lang="en-SG" sz="1400" i="1" dirty="0" err="1"/>
-              <a:t>cross_encoder.predict</a:t>
-            </a:r>
-            <a:r>
-              <a:rPr lang="en-SG" sz="1400" i="1" dirty="0"/>
-              <a:t>(query, </a:t>
-            </a:r>
-            <a:r>
-              <a:rPr lang="en-SG" sz="1400" i="1" dirty="0" err="1"/>
-              <a:t>hit.text</a:t>
-            </a:r>
-            <a:r>
-              <a:rPr lang="en-SG" sz="1400" i="1" dirty="0"/>
-              <a:t>)</a:t>
-            </a:r>
-          </a:p>
-          <a:p>
-            <a:r>
-              <a:rPr lang="en-SG" sz="1400" i="1" dirty="0" err="1"/>
-              <a:t>score_norm</a:t>
-            </a:r>
-            <a:r>
-              <a:rPr lang="en-SG" sz="1400" i="1" dirty="0"/>
-              <a:t> = (</a:t>
-            </a:r>
-            <a:r>
-              <a:rPr lang="en-SG" sz="1400" i="1" dirty="0" err="1"/>
-              <a:t>score_ce</a:t>
-            </a:r>
-            <a:r>
-              <a:rPr lang="en-SG" sz="1400" i="1" dirty="0"/>
-              <a:t> - min) / (max - min)</a:t>
-            </a:r>
-          </a:p>
-          <a:p>
-            <a:r>
-              <a:rPr lang="en-SG" sz="1400" i="1" dirty="0" err="1"/>
-              <a:t>score_final</a:t>
-            </a:r>
-            <a:r>
-              <a:rPr lang="en-SG" sz="1400" i="1" dirty="0"/>
-              <a:t> = </a:t>
-            </a:r>
-            <a:r>
-              <a:rPr lang="en-SG" sz="1400" i="1" dirty="0" err="1"/>
-              <a:t>score_norm</a:t>
-            </a:r>
-            <a:r>
-              <a:rPr lang="en-SG" sz="1400" i="1" dirty="0"/>
-              <a:t> + </a:t>
-            </a:r>
-            <a:r>
-              <a:rPr lang="en-SG" sz="1400" i="1" dirty="0" err="1"/>
-              <a:t>rerank_recency_boost</a:t>
-            </a:r>
-            <a:r>
-              <a:rPr lang="en-SG" sz="1400" i="1" dirty="0"/>
-              <a:t> (if hit is in recent window)</a:t>
+              <a:rPr lang="en-SG" sz="1600" b="1" dirty="0"/>
+              <a:t>Retrieval-merge with Reciprocal Rank Fusion (RRF)</a:t>
+            </a:r>
+          </a:p>
+          <a:p>
+            <a:pPr marL="285750" indent="-285750">
+              <a:buFont typeface="Wingdings" panose="05000000000000000000" pitchFamily="2" charset="2"/>
+              <a:buChar char="Ø"/>
+            </a:pPr>
+            <a:r>
+              <a:rPr lang="en-SG" sz="1600" dirty="0"/>
+              <a:t>Apply RRF to merge the lists</a:t>
+            </a:r>
+          </a:p>
+          <a:p>
+            <a:pPr marL="285750" indent="-285750">
+              <a:buFont typeface="Wingdings" panose="05000000000000000000" pitchFamily="2" charset="2"/>
+              <a:buChar char="Ø"/>
+            </a:pPr>
+            <a:r>
+              <a:rPr lang="en-SG" sz="1600" dirty="0"/>
+              <a:t>Tiered recency boost (multiplicative), consistent on RRF scores (bounded rank-based)</a:t>
+            </a:r>
+          </a:p>
+          <a:p>
+            <a:pPr marL="285750" indent="-285750">
+              <a:buFont typeface="Wingdings" panose="05000000000000000000" pitchFamily="2" charset="2"/>
+              <a:buChar char="Ø"/>
+            </a:pPr>
+            <a:r>
+              <a:rPr lang="en-SG" sz="1600" dirty="0"/>
+              <a:t>Keep </a:t>
+            </a:r>
+            <a:r>
+              <a:rPr lang="en-SG" sz="1600" i="1" dirty="0"/>
+              <a:t>top_n</a:t>
+            </a:r>
+            <a:endParaRPr lang="en-SG" sz="1600" dirty="0"/>
+          </a:p>
+        </p:txBody>
+      </p:sp>
+      <p:sp>
+        <p:nvSpPr>
+          <p:cNvPr id="40" name="TextBox 39">
+            <a:extLst>
+              <a:ext uri="{FF2B5EF4-FFF2-40B4-BE49-F238E27FC236}">
+                <a16:creationId xmlns:a16="http://schemas.microsoft.com/office/drawing/2014/main" id="{6EB3541F-6034-A520-50F6-27798B5FCEDE}"/>
+              </a:ext>
+            </a:extLst>
+          </p:cNvPr>
+          <p:cNvSpPr txBox="1"/>
+          <p:nvPr/>
+        </p:nvSpPr>
+        <p:spPr>
+          <a:xfrm>
+            <a:off x="284668" y="4259028"/>
+            <a:ext cx="2975912" cy="1654299"/>
+          </a:xfrm>
+          <a:prstGeom prst="rect">
+            <a:avLst/>
+          </a:prstGeom>
+          <a:solidFill>
+            <a:schemeClr val="accent6">
+              <a:lumMod val="40000"/>
+              <a:lumOff val="60000"/>
+            </a:schemeClr>
+          </a:solidFill>
+        </p:spPr>
+        <p:txBody>
+          <a:bodyPr wrap="square">
+            <a:spAutoFit/>
+          </a:bodyPr>
+          <a:lstStyle/>
+          <a:p>
+            <a:r>
+              <a:rPr lang="en-SG" sz="1400" b="1" i="1" dirty="0"/>
+              <a:t>Illustrative Example - </a:t>
+            </a:r>
+            <a:r>
+              <a:rPr lang="en-SG" sz="1400" b="1" i="1" dirty="0">
+                <a:solidFill>
+                  <a:srgbClr val="0070C0"/>
+                </a:solidFill>
+              </a:rPr>
+              <a:t>Boost Tier</a:t>
+            </a:r>
+          </a:p>
+          <a:p>
+            <a:endParaRPr lang="en-SG" sz="1400" i="1" dirty="0"/>
+          </a:p>
+          <a:p>
+            <a:r>
+              <a:rPr lang="en-SG" sz="1050" b="1" i="1" dirty="0"/>
+              <a:t>Example (window = 5, base boost = 0.80, latest FY = 2025, delta = latest FY – doc FY):</a:t>
+            </a:r>
+          </a:p>
+          <a:p>
+            <a:r>
+              <a:rPr lang="en-SG" sz="1050" i="1" dirty="0"/>
+              <a:t>FY2025: delta=0 → tier=1.0 → boost=0.80</a:t>
+            </a:r>
+          </a:p>
+          <a:p>
+            <a:r>
+              <a:rPr lang="en-SG" sz="1050" i="1" dirty="0"/>
+              <a:t>FY2024: delta=1 → tier=0.8 → boost=0.64</a:t>
+            </a:r>
+          </a:p>
+          <a:p>
+            <a:r>
+              <a:rPr lang="en-SG" sz="1050" i="1" dirty="0"/>
+              <a:t>FY2023: delta=2 → tier=0.6 → boost=0.48</a:t>
+            </a:r>
+          </a:p>
+          <a:p>
+            <a:r>
+              <a:rPr lang="en-SG" sz="1050" i="1" dirty="0"/>
+              <a:t>FY2022: delta=3 → tier=0.4 → boost=0.32</a:t>
+            </a:r>
+          </a:p>
+          <a:p>
+            <a:r>
+              <a:rPr lang="en-SG" sz="1050" i="1" dirty="0"/>
+              <a:t>FY2021: delta=4 → tier=0.2 → boost=0.16</a:t>
+            </a:r>
+          </a:p>
+        </p:txBody>
+      </p:sp>
+      <p:sp>
+        <p:nvSpPr>
+          <p:cNvPr id="41" name="TextBox 40">
+            <a:extLst>
+              <a:ext uri="{FF2B5EF4-FFF2-40B4-BE49-F238E27FC236}">
+                <a16:creationId xmlns:a16="http://schemas.microsoft.com/office/drawing/2014/main" id="{388449DB-549E-6DA7-B91F-FB70F39842F5}"/>
+              </a:ext>
+            </a:extLst>
+          </p:cNvPr>
+          <p:cNvSpPr txBox="1"/>
+          <p:nvPr/>
+        </p:nvSpPr>
+        <p:spPr>
+          <a:xfrm>
+            <a:off x="284668" y="3641969"/>
+            <a:ext cx="2975913" cy="600164"/>
+          </a:xfrm>
+          <a:prstGeom prst="rect">
+            <a:avLst/>
+          </a:prstGeom>
+          <a:solidFill>
+            <a:schemeClr val="accent6">
+              <a:lumMod val="20000"/>
+              <a:lumOff val="80000"/>
+            </a:schemeClr>
+          </a:solidFill>
+        </p:spPr>
+        <p:txBody>
+          <a:bodyPr wrap="square">
+            <a:spAutoFit/>
+          </a:bodyPr>
+          <a:lstStyle/>
+          <a:p>
+            <a:r>
+              <a:rPr lang="en-SG" sz="1100" b="1" i="1" dirty="0"/>
+              <a:t>Key Formulas:</a:t>
+            </a:r>
+            <a:endParaRPr lang="en-SG" sz="1100" i="1" dirty="0"/>
+          </a:p>
+          <a:p>
+            <a:r>
+              <a:rPr lang="en-SG" sz="1100" b="1" i="1" dirty="0">
+                <a:solidFill>
+                  <a:srgbClr val="0070C0"/>
+                </a:solidFill>
+              </a:rPr>
+              <a:t>boost_tier </a:t>
+            </a:r>
+            <a:r>
+              <a:rPr lang="en-SG" sz="1100" i="1" dirty="0"/>
+              <a:t>= (window - (latest_year – doc_fy)) / window</a:t>
             </a:r>
           </a:p>
         </p:txBody>

</xml_diff>

<commit_message>
added rag integration tests and other tidy ups
</commit_message>
<xml_diff>
--- a/docs/system_architecture.pptx
+++ b/docs/system_architecture.pptx
@@ -9034,7 +9034,7 @@
               </a:pPr>
               <a:r>
                 <a:rPr lang="en-SG" sz="1600" dirty="0"/>
-                <a:t>Frontend – Vercel</a:t>
+                <a:t>Frontend – Vercel (html / css / js)</a:t>
               </a:r>
             </a:p>
             <a:p>
@@ -9060,7 +9060,7 @@
                     <a:srgbClr val="FF0000"/>
                   </a:solidFill>
                 </a:rPr>
-                <a:t>Fly.io / Cloud Run / Railway</a:t>
+                <a:t>Cloud Run (FastAPI)</a:t>
               </a:r>
               <a:endParaRPr lang="en-SG" sz="1200" kern="1200" dirty="0">
                 <a:solidFill>
@@ -12669,13 +12669,7 @@
               <a:rPr lang="en-SG" sz="1200" i="1" dirty="0">
                 <a:hlinkClick r:id="rId3"/>
               </a:rPr>
-              <a:t>Reference:  What is BM25 (Best Matching 25) Algorithm – </a:t>
-            </a:r>
-            <a:r>
-              <a:rPr lang="en-SG" sz="1200" i="1" dirty="0" err="1">
-                <a:hlinkClick r:id="rId3"/>
-              </a:rPr>
-              <a:t>GeeksforGeeks</a:t>
+              <a:t>Reference:  What is BM25 (Best Matching 25) Algorithm – GeeksforGeeks</a:t>
             </a:r>
             <a:endParaRPr lang="en-SG" sz="1200" dirty="0"/>
           </a:p>
@@ -12726,7 +12720,7 @@
             </a:pPr>
             <a:r>
               <a:rPr lang="en-SG" sz="1200" dirty="0"/>
-              <a:t>Further downstream scoring using the 2 components (dense + sparse) is further  described in separate slide</a:t>
+              <a:t>Further downstream scoring using the 2 components (dense + sparse) is further described in separate slide</a:t>
             </a:r>
           </a:p>
           <a:p>

</xml_diff>